<commit_message>
Thu May 31 07:08:15 EDT 2018
</commit_message>
<xml_diff>
--- a/ppt/wireless.pptx
+++ b/ppt/wireless.pptx
@@ -2993,61 +2993,7 @@
                 </a:solidFill>
                 <a:latin typeface="Arial"/>
               </a:rPr>
-              <a:t>Click </a:t>
-            </a:r>
-            <a:r>
-              <a:rPr b="0" lang="en-US" sz="1800" spc="-1" strike="noStrike">
-                <a:solidFill>
-                  <a:srgbClr val="000000"/>
-                </a:solidFill>
-                <a:latin typeface="Arial"/>
-              </a:rPr>
-              <a:t>to edit </a:t>
-            </a:r>
-            <a:r>
-              <a:rPr b="0" lang="en-US" sz="1800" spc="-1" strike="noStrike">
-                <a:solidFill>
-                  <a:srgbClr val="000000"/>
-                </a:solidFill>
-                <a:latin typeface="Arial"/>
-              </a:rPr>
-              <a:t>the </a:t>
-            </a:r>
-            <a:r>
-              <a:rPr b="0" lang="en-US" sz="1800" spc="-1" strike="noStrike">
-                <a:solidFill>
-                  <a:srgbClr val="000000"/>
-                </a:solidFill>
-                <a:latin typeface="Arial"/>
-              </a:rPr>
-              <a:t>title </a:t>
-            </a:r>
-            <a:r>
-              <a:rPr b="0" lang="en-US" sz="1800" spc="-1" strike="noStrike">
-                <a:solidFill>
-                  <a:srgbClr val="000000"/>
-                </a:solidFill>
-                <a:latin typeface="Arial"/>
-              </a:rPr>
-              <a:t>text </a:t>
-            </a:r>
-            <a:r>
-              <a:rPr b="0" lang="en-US" sz="1800" spc="-1" strike="noStrike">
-                <a:solidFill>
-                  <a:srgbClr val="000000"/>
-                </a:solidFill>
-                <a:latin typeface="Arial"/>
-              </a:rPr>
-              <a:t>forma</a:t>
-            </a:r>
-            <a:r>
-              <a:rPr b="0" lang="en-US" sz="1800" spc="-1" strike="noStrike">
-                <a:solidFill>
-                  <a:srgbClr val="000000"/>
-                </a:solidFill>
-                <a:latin typeface="Arial"/>
-              </a:rPr>
-              <a:t>t</a:t>
+              <a:t>Click to edit the title text format</a:t>
             </a:r>
             <a:endParaRPr b="0" lang="en-US" sz="1800" spc="-1" strike="noStrike">
               <a:solidFill>
@@ -3352,16 +3298,7 @@
                 </a:solidFill>
                 <a:latin typeface="Arial"/>
               </a:rPr>
-              <a:t>Click to edit the </a:t>
-            </a:r>
-            <a:r>
-              <a:rPr b="0" lang="en-US" sz="1800" spc="-1" strike="noStrike">
-                <a:solidFill>
-                  <a:srgbClr val="000000"/>
-                </a:solidFill>
-                <a:latin typeface="Arial"/>
-              </a:rPr>
-              <a:t>title text format</a:t>
+              <a:t>Click to edit the title text format</a:t>
             </a:r>
             <a:endParaRPr b="0" lang="en-US" sz="1800" spc="-1" strike="noStrike">
               <a:solidFill>
@@ -3673,7 +3610,7 @@
                 <a:latin typeface="Playfair Display"/>
                 <a:ea typeface="Playfair Display"/>
               </a:rPr>
-              <a:t>I2C/UART/DAC/GPIO over 802.1x WiFi</a:t>
+              <a:t>I2C/UART/SPI/GPIO over 802.1x WiFi</a:t>
             </a:r>
             <a:endParaRPr b="0" lang="en-US" sz="4000" spc="-1" strike="noStrike">
               <a:latin typeface="Arial"/>
@@ -3823,7 +3760,7 @@
       </p:grpSpPr>
       <p:sp>
         <p:nvSpPr>
-          <p:cNvPr id="136" name="CustomShape 1"/>
+          <p:cNvPr id="142" name="CustomShape 1"/>
           <p:cNvSpPr/>
           <p:nvPr/>
         </p:nvSpPr>
@@ -3892,7 +3829,7 @@
       </p:sp>
       <p:sp>
         <p:nvSpPr>
-          <p:cNvPr id="137" name="CustomShape 2"/>
+          <p:cNvPr id="143" name="CustomShape 2"/>
           <p:cNvSpPr/>
           <p:nvPr/>
         </p:nvSpPr>
@@ -3918,7 +3855,7 @@
       </p:sp>
       <p:sp>
         <p:nvSpPr>
-          <p:cNvPr id="138" name="CustomShape 3"/>
+          <p:cNvPr id="144" name="CustomShape 3"/>
           <p:cNvSpPr/>
           <p:nvPr/>
         </p:nvSpPr>
@@ -3944,7 +3881,7 @@
       </p:sp>
       <p:sp>
         <p:nvSpPr>
-          <p:cNvPr id="139" name="CustomShape 4"/>
+          <p:cNvPr id="145" name="CustomShape 4"/>
           <p:cNvSpPr/>
           <p:nvPr/>
         </p:nvSpPr>
@@ -4023,7 +3960,7 @@
       </p:sp>
       <p:pic>
         <p:nvPicPr>
-          <p:cNvPr id="140" name="Picture 3" descr=""/>
+          <p:cNvPr id="146" name="Picture 3" descr=""/>
           <p:cNvPicPr/>
           <p:nvPr/>
         </p:nvPicPr>
@@ -4095,7 +4032,7 @@
       </p:grpSpPr>
       <p:sp>
         <p:nvSpPr>
-          <p:cNvPr id="141" name="CustomShape 1"/>
+          <p:cNvPr id="147" name="CustomShape 1"/>
           <p:cNvSpPr/>
           <p:nvPr/>
         </p:nvSpPr>
@@ -4177,16 +4114,6 @@
               </a:lnSpc>
             </a:pPr>
             <a:r>
-              <a:rPr b="1" lang="en-US" sz="1800" spc="-1" strike="noStrike">
-                <a:solidFill>
-                  <a:srgbClr val="ce181e"/>
-                </a:solidFill>
-                <a:latin typeface="Arial"/>
-                <a:ea typeface="DejaVu Sans"/>
-              </a:rPr>
-              <a:t>AT+CIFSR</a:t>
-            </a:r>
-            <a:r>
               <a:rPr b="0" lang="en-US" sz="1800" spc="-1" strike="noStrike">
                 <a:solidFill>
                   <a:srgbClr val="000000"/>
@@ -4194,7 +4121,7 @@
                 <a:latin typeface="Arial"/>
                 <a:ea typeface="DejaVu Sans"/>
               </a:rPr>
-              <a:t> lets you view ip address once you join network successfully.</a:t>
+              <a:t>AT+CIFSR lets you view ip address once you join network successfully.</a:t>
             </a:r>
             <a:endParaRPr b="0" lang="en-US" sz="1800" spc="-1" strike="noStrike">
               <a:latin typeface="Arial"/>
@@ -4244,7 +4171,7 @@
       </p:sp>
       <p:sp>
         <p:nvSpPr>
-          <p:cNvPr id="142" name="CustomShape 2"/>
+          <p:cNvPr id="148" name="CustomShape 2"/>
           <p:cNvSpPr/>
           <p:nvPr/>
         </p:nvSpPr>
@@ -4270,7 +4197,7 @@
       </p:sp>
       <p:sp>
         <p:nvSpPr>
-          <p:cNvPr id="143" name="CustomShape 3"/>
+          <p:cNvPr id="149" name="CustomShape 3"/>
           <p:cNvSpPr/>
           <p:nvPr/>
         </p:nvSpPr>
@@ -4296,7 +4223,7 @@
       </p:sp>
       <p:sp>
         <p:nvSpPr>
-          <p:cNvPr id="144" name="CustomShape 4"/>
+          <p:cNvPr id="150" name="CustomShape 4"/>
           <p:cNvSpPr/>
           <p:nvPr/>
         </p:nvSpPr>
@@ -4375,7 +4302,7 @@
       </p:sp>
       <p:pic>
         <p:nvPicPr>
-          <p:cNvPr id="145" name="Picture 139" descr=""/>
+          <p:cNvPr id="151" name="Picture 139" descr=""/>
           <p:cNvPicPr/>
           <p:nvPr/>
         </p:nvPicPr>
@@ -4385,8 +4312,8 @@
         </p:blipFill>
         <p:spPr>
           <a:xfrm>
-            <a:off x="365760" y="2590920"/>
-            <a:ext cx="4389120" cy="2346840"/>
+            <a:off x="311760" y="2285640"/>
+            <a:ext cx="4959000" cy="2651400"/>
           </a:xfrm>
           <a:prstGeom prst="rect">
             <a:avLst/>
@@ -4398,7 +4325,7 @@
       </p:pic>
       <p:pic>
         <p:nvPicPr>
-          <p:cNvPr id="146" name="Picture 140" descr=""/>
+          <p:cNvPr id="152" name="Picture 140" descr=""/>
           <p:cNvPicPr/>
           <p:nvPr/>
         </p:nvPicPr>
@@ -4408,7 +4335,7 @@
         </p:blipFill>
         <p:spPr>
           <a:xfrm>
-            <a:off x="5165280" y="2561040"/>
+            <a:off x="5394960" y="2359800"/>
             <a:ext cx="3521520" cy="2285280"/>
           </a:xfrm>
           <a:prstGeom prst="rect">
@@ -4470,7 +4397,7 @@
       </p:grpSpPr>
       <p:sp>
         <p:nvSpPr>
-          <p:cNvPr id="147" name="CustomShape 1"/>
+          <p:cNvPr id="153" name="CustomShape 1"/>
           <p:cNvSpPr/>
           <p:nvPr/>
         </p:nvSpPr>
@@ -4539,7 +4466,7 @@
                 <a:latin typeface="Arial"/>
                 <a:ea typeface="DejaVu Sans"/>
               </a:rPr>
-              <a:t>Please issue a rebooot after you successfully join wireless network.</a:t>
+              <a:t>Once device joins WiFi user can see using AT+ command, BLUE LED will start blinking as firmware broadcasts IP Address every 5 seconds.</a:t>
             </a:r>
             <a:endParaRPr b="0" lang="en-US" sz="1800" spc="-1" strike="noStrike">
               <a:latin typeface="Arial"/>
@@ -4569,17 +4496,7 @@
                 <a:latin typeface="Arial"/>
                 <a:ea typeface="DejaVu Sans"/>
               </a:rPr>
-              <a:t>Once device joins WiFi user can see using AT+ command, BLUE LED will </a:t>
-            </a:r>
-            <a:r>
-              <a:rPr b="0" lang="en-US" sz="1800" spc="-1" strike="noStrike">
-                <a:solidFill>
-                  <a:srgbClr val="ce181e"/>
-                </a:solidFill>
-                <a:latin typeface="Arial"/>
-                <a:ea typeface="DejaVu Sans"/>
-              </a:rPr>
-              <a:t>start blinking</a:t>
+              <a:t> </a:t>
             </a:r>
             <a:r>
               <a:rPr b="0" lang="en-US" sz="1800" spc="-1" strike="noStrike">
@@ -4589,7 +4506,7 @@
                 <a:latin typeface="Arial"/>
                 <a:ea typeface="DejaVu Sans"/>
               </a:rPr>
-              <a:t> as firmware broadcasts IP Address.</a:t>
+              <a:t>PC GUI/console Application locates wireless device using UDP broadcast.</a:t>
             </a:r>
             <a:endParaRPr b="0" lang="en-US" sz="1800" spc="-1" strike="noStrike">
               <a:latin typeface="Arial"/>
@@ -4601,6 +4518,16 @@
                 <a:spcPct val="100000"/>
               </a:lnSpc>
             </a:pPr>
+            <a:r>
+              <a:rPr b="0" lang="en-US" sz="1800" spc="-1" strike="noStrike">
+                <a:solidFill>
+                  <a:srgbClr val="000000"/>
+                </a:solidFill>
+                <a:latin typeface="Arial"/>
+                <a:ea typeface="DejaVu Sans"/>
+              </a:rPr>
+              <a:t>  </a:t>
+            </a:r>
             <a:endParaRPr b="0" lang="en-US" sz="1800" spc="-1" strike="noStrike">
               <a:latin typeface="Arial"/>
             </a:endParaRPr>
@@ -4615,11 +4542,21 @@
               <a:latin typeface="Arial"/>
             </a:endParaRPr>
           </a:p>
+          <a:p>
+            <a:pPr>
+              <a:lnSpc>
+                <a:spcPct val="100000"/>
+              </a:lnSpc>
+            </a:pPr>
+            <a:endParaRPr b="0" lang="en-US" sz="1800" spc="-1" strike="noStrike">
+              <a:latin typeface="Arial"/>
+            </a:endParaRPr>
+          </a:p>
         </p:txBody>
       </p:sp>
       <p:sp>
         <p:nvSpPr>
-          <p:cNvPr id="148" name="CustomShape 2"/>
+          <p:cNvPr id="154" name="CustomShape 2"/>
           <p:cNvSpPr/>
           <p:nvPr/>
         </p:nvSpPr>
@@ -4645,7 +4582,7 @@
       </p:sp>
       <p:sp>
         <p:nvSpPr>
-          <p:cNvPr id="149" name="CustomShape 3"/>
+          <p:cNvPr id="155" name="CustomShape 3"/>
           <p:cNvSpPr/>
           <p:nvPr/>
         </p:nvSpPr>
@@ -4671,7 +4608,7 @@
       </p:sp>
       <p:sp>
         <p:nvSpPr>
-          <p:cNvPr id="150" name="CustomShape 4"/>
+          <p:cNvPr id="156" name="CustomShape 4"/>
           <p:cNvSpPr/>
           <p:nvPr/>
         </p:nvSpPr>
@@ -4799,7 +4736,7 @@
       </p:grpSpPr>
       <p:sp>
         <p:nvSpPr>
-          <p:cNvPr id="151" name="CustomShape 1"/>
+          <p:cNvPr id="157" name="CustomShape 1"/>
           <p:cNvSpPr/>
           <p:nvPr/>
         </p:nvSpPr>
@@ -4858,7 +4795,7 @@
       </p:sp>
       <p:sp>
         <p:nvSpPr>
-          <p:cNvPr id="152" name="CustomShape 2"/>
+          <p:cNvPr id="158" name="CustomShape 2"/>
           <p:cNvSpPr/>
           <p:nvPr/>
         </p:nvSpPr>
@@ -4884,7 +4821,7 @@
       </p:sp>
       <p:sp>
         <p:nvSpPr>
-          <p:cNvPr id="153" name="CustomShape 3"/>
+          <p:cNvPr id="159" name="CustomShape 3"/>
           <p:cNvSpPr/>
           <p:nvPr/>
         </p:nvSpPr>
@@ -4910,7 +4847,7 @@
       </p:sp>
       <p:pic>
         <p:nvPicPr>
-          <p:cNvPr id="154" name="Picture 2" descr=""/>
+          <p:cNvPr id="160" name="Picture 2" descr=""/>
           <p:cNvPicPr/>
           <p:nvPr/>
         </p:nvPicPr>
@@ -4933,7 +4870,7 @@
       </p:pic>
       <p:sp>
         <p:nvSpPr>
-          <p:cNvPr id="155" name="CustomShape 4"/>
+          <p:cNvPr id="161" name="CustomShape 4"/>
           <p:cNvSpPr/>
           <p:nvPr/>
         </p:nvSpPr>
@@ -5022,7 +4959,7 @@
       </p:sp>
       <p:pic>
         <p:nvPicPr>
-          <p:cNvPr id="156" name="Picture 2" descr=""/>
+          <p:cNvPr id="162" name="Picture 2" descr=""/>
           <p:cNvPicPr/>
           <p:nvPr/>
         </p:nvPicPr>
@@ -5094,7 +5031,7 @@
       </p:grpSpPr>
       <p:sp>
         <p:nvSpPr>
-          <p:cNvPr id="157" name="CustomShape 1"/>
+          <p:cNvPr id="163" name="CustomShape 1"/>
           <p:cNvSpPr/>
           <p:nvPr/>
         </p:nvSpPr>
@@ -5153,7 +5090,7 @@
       </p:sp>
       <p:sp>
         <p:nvSpPr>
-          <p:cNvPr id="158" name="CustomShape 2"/>
+          <p:cNvPr id="164" name="CustomShape 2"/>
           <p:cNvSpPr/>
           <p:nvPr/>
         </p:nvSpPr>
@@ -5179,7 +5116,7 @@
       </p:sp>
       <p:sp>
         <p:nvSpPr>
-          <p:cNvPr id="159" name="CustomShape 3"/>
+          <p:cNvPr id="165" name="CustomShape 3"/>
           <p:cNvSpPr/>
           <p:nvPr/>
         </p:nvSpPr>
@@ -5205,7 +5142,7 @@
       </p:sp>
       <p:pic>
         <p:nvPicPr>
-          <p:cNvPr id="160" name="Picture 2" descr=""/>
+          <p:cNvPr id="166" name="Picture 2" descr=""/>
           <p:cNvPicPr/>
           <p:nvPr/>
         </p:nvPicPr>
@@ -5228,7 +5165,7 @@
       </p:pic>
       <p:pic>
         <p:nvPicPr>
-          <p:cNvPr id="161" name="Picture 4" descr=""/>
+          <p:cNvPr id="167" name="Picture 4" descr=""/>
           <p:cNvPicPr/>
           <p:nvPr/>
         </p:nvPicPr>
@@ -5300,7 +5237,7 @@
       </p:grpSpPr>
       <p:sp>
         <p:nvSpPr>
-          <p:cNvPr id="162" name="CustomShape 1"/>
+          <p:cNvPr id="168" name="CustomShape 1"/>
           <p:cNvSpPr/>
           <p:nvPr/>
         </p:nvSpPr>
@@ -5359,7 +5296,7 @@
       </p:sp>
       <p:sp>
         <p:nvSpPr>
-          <p:cNvPr id="163" name="CustomShape 2"/>
+          <p:cNvPr id="169" name="CustomShape 2"/>
           <p:cNvSpPr/>
           <p:nvPr/>
         </p:nvSpPr>
@@ -5385,7 +5322,7 @@
       </p:sp>
       <p:sp>
         <p:nvSpPr>
-          <p:cNvPr id="164" name="CustomShape 3"/>
+          <p:cNvPr id="170" name="CustomShape 3"/>
           <p:cNvSpPr/>
           <p:nvPr/>
         </p:nvSpPr>
@@ -5411,7 +5348,7 @@
       </p:sp>
       <p:sp>
         <p:nvSpPr>
-          <p:cNvPr id="165" name="CustomShape 4"/>
+          <p:cNvPr id="171" name="CustomShape 4"/>
           <p:cNvSpPr/>
           <p:nvPr/>
         </p:nvSpPr>
@@ -5550,7 +5487,7 @@
                 <a:latin typeface="Arial"/>
                 <a:ea typeface="DejaVu Sans"/>
               </a:rPr>
-              <a:t>4. Virtual LED ( No Real Light Emitting Diode, PC Apps shows LED glowing)</a:t>
+              <a:t>4. Virtual LED ( No Real Light Emitting Diode, PC Apps shows LED glowing) when VCC or GND asserted on PIN device.</a:t>
             </a:r>
             <a:endParaRPr b="0" lang="en-US" sz="1800" spc="-1" strike="noStrike">
               <a:latin typeface="Arial"/>
@@ -5639,7 +5576,7 @@
       </p:grpSpPr>
       <p:sp>
         <p:nvSpPr>
-          <p:cNvPr id="166" name="CustomShape 1"/>
+          <p:cNvPr id="172" name="CustomShape 1"/>
           <p:cNvSpPr/>
           <p:nvPr/>
         </p:nvSpPr>
@@ -5688,7 +5625,7 @@
       </p:sp>
       <p:sp>
         <p:nvSpPr>
-          <p:cNvPr id="167" name="CustomShape 2"/>
+          <p:cNvPr id="173" name="CustomShape 2"/>
           <p:cNvSpPr/>
           <p:nvPr/>
         </p:nvSpPr>
@@ -5747,7 +5684,7 @@
       </p:sp>
       <p:pic>
         <p:nvPicPr>
-          <p:cNvPr id="168" name="Picture 2" descr=""/>
+          <p:cNvPr id="174" name="Picture 2" descr=""/>
           <p:cNvPicPr/>
           <p:nvPr/>
         </p:nvPicPr>
@@ -5770,7 +5707,7 @@
       </p:pic>
       <p:sp>
         <p:nvSpPr>
-          <p:cNvPr id="169" name="CustomShape 3"/>
+          <p:cNvPr id="175" name="CustomShape 3"/>
           <p:cNvSpPr/>
           <p:nvPr/>
         </p:nvSpPr>
@@ -5796,7 +5733,7 @@
       </p:sp>
       <p:graphicFrame>
         <p:nvGraphicFramePr>
-          <p:cNvPr id="170" name="Table 4"/>
+          <p:cNvPr id="176" name="Table 4"/>
           <p:cNvGraphicFramePr/>
           <p:nvPr/>
         </p:nvGraphicFramePr>
@@ -7199,7 +7136,7 @@
       </p:graphicFrame>
       <p:pic>
         <p:nvPicPr>
-          <p:cNvPr id="171" name="Picture 7" descr=""/>
+          <p:cNvPr id="177" name="Picture 7" descr=""/>
           <p:cNvPicPr/>
           <p:nvPr/>
         </p:nvPicPr>
@@ -7271,7 +7208,7 @@
       </p:grpSpPr>
       <p:sp>
         <p:nvSpPr>
-          <p:cNvPr id="172" name="CustomShape 1"/>
+          <p:cNvPr id="178" name="CustomShape 1"/>
           <p:cNvSpPr/>
           <p:nvPr/>
         </p:nvSpPr>
@@ -7320,7 +7257,7 @@
       </p:sp>
       <p:sp>
         <p:nvSpPr>
-          <p:cNvPr id="173" name="CustomShape 2"/>
+          <p:cNvPr id="179" name="CustomShape 2"/>
           <p:cNvSpPr/>
           <p:nvPr/>
         </p:nvSpPr>
@@ -7346,7 +7283,7 @@
       </p:sp>
       <p:pic>
         <p:nvPicPr>
-          <p:cNvPr id="174" name="Picture 2" descr=""/>
+          <p:cNvPr id="180" name="Picture 2" descr=""/>
           <p:cNvPicPr/>
           <p:nvPr/>
         </p:nvPicPr>
@@ -7369,7 +7306,7 @@
       </p:pic>
       <p:sp>
         <p:nvSpPr>
-          <p:cNvPr id="175" name="CustomShape 3"/>
+          <p:cNvPr id="181" name="CustomShape 3"/>
           <p:cNvSpPr/>
           <p:nvPr/>
         </p:nvSpPr>
@@ -7395,7 +7332,7 @@
       </p:sp>
       <p:graphicFrame>
         <p:nvGraphicFramePr>
-          <p:cNvPr id="176" name="Table 4"/>
+          <p:cNvPr id="182" name="Table 4"/>
           <p:cNvGraphicFramePr/>
           <p:nvPr/>
         </p:nvGraphicFramePr>
@@ -8490,7 +8427,7 @@
       </p:graphicFrame>
       <p:sp>
         <p:nvSpPr>
-          <p:cNvPr id="177" name="CustomShape 5"/>
+          <p:cNvPr id="183" name="CustomShape 5"/>
           <p:cNvSpPr/>
           <p:nvPr/>
         </p:nvSpPr>
@@ -8539,7 +8476,7 @@
       </p:sp>
       <p:sp>
         <p:nvSpPr>
-          <p:cNvPr id="178" name="CustomShape 6"/>
+          <p:cNvPr id="184" name="CustomShape 6"/>
           <p:cNvSpPr/>
           <p:nvPr/>
         </p:nvSpPr>
@@ -8580,25 +8517,21 @@
               </a:rPr>
               <a:t>Open licensed source GUI </a:t>
             </a:r>
-            <a:endParaRPr b="0" lang="en-US" sz="1800" spc="-1" strike="noStrike">
-              <a:latin typeface="Arial"/>
-            </a:endParaRPr>
-          </a:p>
-          <a:p>
-            <a:pPr algn="ctr">
-              <a:lnSpc>
-                <a:spcPct val="100000"/>
-              </a:lnSpc>
-            </a:pPr>
             <a:r>
-              <a:rPr b="1" lang="en-US" sz="1800" spc="-1" strike="noStrike">
+              <a:rPr b="0" lang="en-US" sz="1800" spc="-1" strike="noStrike" u="sng">
                 <a:solidFill>
-                  <a:srgbClr val="1b75bc"/>
+                  <a:srgbClr val="0000ff"/>
                 </a:solidFill>
+                <a:uFill>
+                  <a:solidFill>
+                    <a:srgbClr val="ffffff"/>
+                  </a:solidFill>
+                </a:uFill>
                 <a:latin typeface="Arial"/>
                 <a:ea typeface="Arial"/>
+                <a:hlinkClick r:id="rId2"/>
               </a:rPr>
-              <a:t>https://github.com/natashaiwscope/iot_hw</a:t>
+              <a:t>https://github.com/natashaiwscope/emulator_v0</a:t>
             </a:r>
             <a:endParaRPr b="0" lang="en-US" sz="1800" spc="-1" strike="noStrike">
               <a:latin typeface="Arial"/>
@@ -8608,12 +8541,12 @@
       </p:sp>
       <p:pic>
         <p:nvPicPr>
-          <p:cNvPr id="179" name="Picture 9" descr=""/>
+          <p:cNvPr id="185" name="Picture 9" descr=""/>
           <p:cNvPicPr/>
           <p:nvPr/>
         </p:nvPicPr>
         <p:blipFill>
-          <a:blip r:embed="rId2"/>
+          <a:blip r:embed="rId3"/>
           <a:stretch/>
         </p:blipFill>
         <p:spPr>
@@ -8680,7 +8613,7 @@
       </p:grpSpPr>
       <p:sp>
         <p:nvSpPr>
-          <p:cNvPr id="180" name="CustomShape 1"/>
+          <p:cNvPr id="186" name="CustomShape 1"/>
           <p:cNvSpPr/>
           <p:nvPr/>
         </p:nvSpPr>
@@ -8739,7 +8672,7 @@
       </p:sp>
       <p:sp>
         <p:nvSpPr>
-          <p:cNvPr id="181" name="CustomShape 2"/>
+          <p:cNvPr id="187" name="CustomShape 2"/>
           <p:cNvSpPr/>
           <p:nvPr/>
         </p:nvSpPr>
@@ -8765,7 +8698,7 @@
       </p:sp>
       <p:pic>
         <p:nvPicPr>
-          <p:cNvPr id="182" name="Picture 2" descr=""/>
+          <p:cNvPr id="188" name="Picture 2" descr=""/>
           <p:cNvPicPr/>
           <p:nvPr/>
         </p:nvPicPr>
@@ -8837,7 +8770,7 @@
       </p:grpSpPr>
       <p:sp>
         <p:nvSpPr>
-          <p:cNvPr id="183" name="CustomShape 1"/>
+          <p:cNvPr id="189" name="CustomShape 1"/>
           <p:cNvSpPr/>
           <p:nvPr/>
         </p:nvSpPr>
@@ -8896,7 +8829,7 @@
       </p:sp>
       <p:sp>
         <p:nvSpPr>
-          <p:cNvPr id="184" name="CustomShape 2"/>
+          <p:cNvPr id="190" name="CustomShape 2"/>
           <p:cNvSpPr/>
           <p:nvPr/>
         </p:nvSpPr>
@@ -8922,7 +8855,7 @@
       </p:sp>
       <p:pic>
         <p:nvPicPr>
-          <p:cNvPr id="185" name="Picture 2" descr=""/>
+          <p:cNvPr id="191" name="Picture 2" descr=""/>
           <p:cNvPicPr/>
           <p:nvPr/>
         </p:nvPicPr>
@@ -9357,7 +9290,7 @@
       </p:grpSpPr>
       <p:sp>
         <p:nvSpPr>
-          <p:cNvPr id="186" name="CustomShape 1"/>
+          <p:cNvPr id="192" name="CustomShape 1"/>
           <p:cNvSpPr/>
           <p:nvPr/>
         </p:nvSpPr>
@@ -9416,7 +9349,7 @@
       </p:sp>
       <p:sp>
         <p:nvSpPr>
-          <p:cNvPr id="187" name="CustomShape 2"/>
+          <p:cNvPr id="193" name="CustomShape 2"/>
           <p:cNvSpPr/>
           <p:nvPr/>
         </p:nvSpPr>
@@ -9442,7 +9375,7 @@
       </p:sp>
       <p:pic>
         <p:nvPicPr>
-          <p:cNvPr id="188" name="Picture 4" descr=""/>
+          <p:cNvPr id="194" name="Picture 4" descr=""/>
           <p:cNvPicPr/>
           <p:nvPr/>
         </p:nvPicPr>
@@ -9514,7 +9447,7 @@
       </p:grpSpPr>
       <p:sp>
         <p:nvSpPr>
-          <p:cNvPr id="189" name="CustomShape 1"/>
+          <p:cNvPr id="195" name="CustomShape 1"/>
           <p:cNvSpPr/>
           <p:nvPr/>
         </p:nvSpPr>
@@ -9573,7 +9506,7 @@
       </p:sp>
       <p:sp>
         <p:nvSpPr>
-          <p:cNvPr id="190" name="CustomShape 2"/>
+          <p:cNvPr id="196" name="CustomShape 2"/>
           <p:cNvSpPr/>
           <p:nvPr/>
         </p:nvSpPr>
@@ -9599,7 +9532,7 @@
       </p:sp>
       <p:pic>
         <p:nvPicPr>
-          <p:cNvPr id="191" name="Picture 3" descr=""/>
+          <p:cNvPr id="197" name="Picture 3" descr=""/>
           <p:cNvPicPr/>
           <p:nvPr/>
         </p:nvPicPr>
@@ -9671,7 +9604,7 @@
       </p:grpSpPr>
       <p:sp>
         <p:nvSpPr>
-          <p:cNvPr id="192" name="CustomShape 1"/>
+          <p:cNvPr id="198" name="CustomShape 1"/>
           <p:cNvSpPr/>
           <p:nvPr/>
         </p:nvSpPr>
@@ -9730,7 +9663,7 @@
       </p:sp>
       <p:sp>
         <p:nvSpPr>
-          <p:cNvPr id="193" name="CustomShape 2"/>
+          <p:cNvPr id="199" name="CustomShape 2"/>
           <p:cNvSpPr/>
           <p:nvPr/>
         </p:nvSpPr>
@@ -9756,7 +9689,7 @@
       </p:sp>
       <p:pic>
         <p:nvPicPr>
-          <p:cNvPr id="194" name="Picture 2" descr=""/>
+          <p:cNvPr id="200" name="Picture 2" descr=""/>
           <p:cNvPicPr/>
           <p:nvPr/>
         </p:nvPicPr>
@@ -9828,7 +9761,7 @@
       </p:grpSpPr>
       <p:sp>
         <p:nvSpPr>
-          <p:cNvPr id="195" name="CustomShape 1"/>
+          <p:cNvPr id="201" name="CustomShape 1"/>
           <p:cNvSpPr/>
           <p:nvPr/>
         </p:nvSpPr>
@@ -9887,7 +9820,7 @@
       </p:sp>
       <p:sp>
         <p:nvSpPr>
-          <p:cNvPr id="196" name="CustomShape 2"/>
+          <p:cNvPr id="202" name="CustomShape 2"/>
           <p:cNvSpPr/>
           <p:nvPr/>
         </p:nvSpPr>
@@ -10240,7 +10173,7 @@
       </p:grpSpPr>
       <p:sp>
         <p:nvSpPr>
-          <p:cNvPr id="197" name="CustomShape 1"/>
+          <p:cNvPr id="203" name="CustomShape 1"/>
           <p:cNvSpPr/>
           <p:nvPr/>
         </p:nvSpPr>
@@ -10299,7 +10232,7 @@
       </p:sp>
       <p:sp>
         <p:nvSpPr>
-          <p:cNvPr id="198" name="CustomShape 2"/>
+          <p:cNvPr id="204" name="CustomShape 2"/>
           <p:cNvSpPr/>
           <p:nvPr/>
         </p:nvSpPr>
@@ -11105,7 +11038,7 @@
         </p:nvSpPr>
         <p:spPr>
           <a:xfrm>
-            <a:off x="544680" y="3298320"/>
+            <a:off x="394560" y="3385080"/>
             <a:ext cx="1128960" cy="403920"/>
           </a:xfrm>
           <a:prstGeom prst="rect">
@@ -11131,7 +11064,7 @@
               </a:lnSpc>
             </a:pPr>
             <a:r>
-              <a:rPr b="0" lang="en-US" sz="1400" spc="-1" strike="noStrike">
+              <a:rPr b="1" lang="en-US" sz="1400" spc="-1" strike="noStrike">
                 <a:solidFill>
                   <a:srgbClr val="ff0000"/>
                 </a:solidFill>
@@ -11180,9 +11113,9 @@
               </a:lnSpc>
             </a:pPr>
             <a:r>
-              <a:rPr b="0" lang="en-US" sz="1400" spc="-1" strike="noStrike">
+              <a:rPr b="1" lang="en-US" sz="1400" spc="-1" strike="noStrike">
                 <a:solidFill>
-                  <a:srgbClr val="ff0000"/>
+                  <a:srgbClr val="7030a0"/>
                 </a:solidFill>
                 <a:latin typeface="Arial"/>
                 <a:ea typeface="Arial"/>
@@ -11203,8 +11136,8 @@
         </p:nvSpPr>
         <p:spPr>
           <a:xfrm>
-            <a:off x="6039720" y="1738080"/>
-            <a:ext cx="2199960" cy="238320"/>
+            <a:off x="6324480" y="1741320"/>
+            <a:ext cx="1960920" cy="424080"/>
           </a:xfrm>
           <a:prstGeom prst="rect">
             <a:avLst/>
@@ -11236,41 +11169,12 @@
                 <a:latin typeface="Arial"/>
                 <a:ea typeface="Arial"/>
               </a:rPr>
-              <a:t>Micro USB just for power supply</a:t>
+              <a:t>Micro USB just for power supply </a:t>
             </a:r>
             <a:endParaRPr b="0" lang="en-US" sz="900" spc="-1" strike="noStrike">
               <a:latin typeface="Arial"/>
             </a:endParaRPr>
           </a:p>
-        </p:txBody>
-      </p:sp>
-      <p:sp>
-        <p:nvSpPr>
-          <p:cNvPr id="94" name="CustomShape 6"/>
-          <p:cNvSpPr/>
-          <p:nvPr/>
-        </p:nvSpPr>
-        <p:spPr>
-          <a:xfrm>
-            <a:off x="6161400" y="4141440"/>
-            <a:ext cx="601200" cy="222120"/>
-          </a:xfrm>
-          <a:prstGeom prst="rect">
-            <a:avLst/>
-          </a:prstGeom>
-          <a:noFill/>
-          <a:ln>
-            <a:noFill/>
-          </a:ln>
-        </p:spPr>
-        <p:style>
-          <a:lnRef idx="0"/>
-          <a:fillRef idx="0"/>
-          <a:effectRef idx="0"/>
-          <a:fontRef idx="minor"/>
-        </p:style>
-        <p:txBody>
-          <a:bodyPr lIns="90000" rIns="90000" tIns="91440" bIns="91440"/>
           <a:p>
             <a:pPr>
               <a:lnSpc>
@@ -11278,16 +11182,16 @@
               </a:lnSpc>
             </a:pPr>
             <a:r>
-              <a:rPr b="1" lang="en-US" sz="600" spc="-1" strike="noStrike">
+              <a:rPr b="1" lang="en-US" sz="900" spc="-1" strike="noStrike">
                 <a:solidFill>
                   <a:srgbClr val="ff0000"/>
                 </a:solidFill>
                 <a:latin typeface="Arial"/>
-                <a:ea typeface="Arial"/>
+                <a:ea typeface="DejaVu Sans"/>
               </a:rPr>
-              <a:t>Reset button</a:t>
+              <a:t>And CDC/HID Interface</a:t>
             </a:r>
-            <a:endParaRPr b="0" lang="en-US" sz="600" spc="-1" strike="noStrike">
+            <a:endParaRPr b="0" lang="en-US" sz="900" spc="-1" strike="noStrike">
               <a:latin typeface="Arial"/>
             </a:endParaRPr>
           </a:p>
@@ -11295,7 +11199,7 @@
       </p:sp>
       <p:sp>
         <p:nvSpPr>
-          <p:cNvPr id="95" name="CustomShape 7"/>
+          <p:cNvPr id="94" name="CustomShape 6"/>
           <p:cNvSpPr/>
           <p:nvPr/>
         </p:nvSpPr>
@@ -11344,14 +11248,14 @@
       </p:sp>
       <p:sp>
         <p:nvSpPr>
-          <p:cNvPr id="96" name="CustomShape 8"/>
+          <p:cNvPr id="95" name="CustomShape 7"/>
           <p:cNvSpPr/>
           <p:nvPr/>
         </p:nvSpPr>
         <p:spPr>
           <a:xfrm>
-            <a:off x="732240" y="3718800"/>
-            <a:ext cx="978480" cy="533160"/>
+            <a:off x="372960" y="3956760"/>
+            <a:ext cx="1166040" cy="533160"/>
           </a:xfrm>
           <a:prstGeom prst="rect">
             <a:avLst/>
@@ -11376,7 +11280,7 @@
               </a:lnSpc>
             </a:pPr>
             <a:r>
-              <a:rPr b="1" lang="en-US" sz="1200" spc="-1" strike="noStrike">
+              <a:rPr b="1" lang="en-US" sz="1400" spc="-1" strike="noStrike">
                 <a:solidFill>
                   <a:srgbClr val="ff0000"/>
                 </a:solidFill>
@@ -11385,7 +11289,7 @@
               </a:rPr>
               <a:t>I2C SDA</a:t>
             </a:r>
-            <a:endParaRPr b="0" lang="en-US" sz="1200" spc="-1" strike="noStrike">
+            <a:endParaRPr b="0" lang="en-US" sz="1400" spc="-1" strike="noStrike">
               <a:latin typeface="Arial"/>
             </a:endParaRPr>
           </a:p>
@@ -11396,7 +11300,7 @@
               </a:lnSpc>
             </a:pPr>
             <a:r>
-              <a:rPr b="1" lang="en-US" sz="1200" spc="-1" strike="noStrike">
+              <a:rPr b="1" lang="en-US" sz="1400" spc="-1" strike="noStrike">
                 <a:solidFill>
                   <a:srgbClr val="ff0000"/>
                 </a:solidFill>
@@ -11405,7 +11309,7 @@
               </a:rPr>
               <a:t>I2C SCL</a:t>
             </a:r>
-            <a:endParaRPr b="0" lang="en-US" sz="1200" spc="-1" strike="noStrike">
+            <a:endParaRPr b="0" lang="en-US" sz="1400" spc="-1" strike="noStrike">
               <a:latin typeface="Arial"/>
             </a:endParaRPr>
           </a:p>
@@ -11415,7 +11319,7 @@
                 <a:spcPct val="100000"/>
               </a:lnSpc>
             </a:pPr>
-            <a:endParaRPr b="0" lang="en-US" sz="1200" spc="-1" strike="noStrike">
+            <a:endParaRPr b="0" lang="en-US" sz="1400" spc="-1" strike="noStrike">
               <a:latin typeface="Arial"/>
             </a:endParaRPr>
           </a:p>
@@ -11423,14 +11327,14 @@
       </p:sp>
       <p:sp>
         <p:nvSpPr>
-          <p:cNvPr id="97" name="CustomShape 9"/>
+          <p:cNvPr id="96" name="CustomShape 8"/>
           <p:cNvSpPr/>
           <p:nvPr/>
         </p:nvSpPr>
         <p:spPr>
           <a:xfrm>
-            <a:off x="371160" y="3055320"/>
-            <a:ext cx="1468440" cy="250920"/>
+            <a:off x="152280" y="2647080"/>
+            <a:ext cx="1904760" cy="659160"/>
           </a:xfrm>
           <a:prstGeom prst="rect">
             <a:avLst/>
@@ -11457,22 +11361,62 @@
             <a:r>
               <a:rPr b="1" lang="en-US" sz="1200" spc="-1" strike="noStrike">
                 <a:solidFill>
-                  <a:srgbClr val="ff0000"/>
+                  <a:srgbClr val="0070c0"/>
                 </a:solidFill>
                 <a:latin typeface="Arial"/>
                 <a:ea typeface="DejaVu Sans"/>
               </a:rPr>
-              <a:t>4 Analog Channel </a:t>
+              <a:t>4 Analog Channel</a:t>
             </a:r>
             <a:endParaRPr b="0" lang="en-US" sz="1200" spc="-1" strike="noStrike">
               <a:latin typeface="Arial"/>
             </a:endParaRPr>
           </a:p>
+          <a:p>
+            <a:pPr>
+              <a:lnSpc>
+                <a:spcPct val="100000"/>
+              </a:lnSpc>
+            </a:pPr>
+            <a:r>
+              <a:rPr b="1" lang="en-US" sz="1200" spc="-1" strike="noStrike">
+                <a:solidFill>
+                  <a:srgbClr val="0070c0"/>
+                </a:solidFill>
+                <a:latin typeface="Arial"/>
+                <a:ea typeface="DejaVu Sans"/>
+              </a:rPr>
+              <a:t>Or 4 Digital Input</a:t>
+            </a:r>
+            <a:endParaRPr b="0" lang="en-US" sz="1200" spc="-1" strike="noStrike">
+              <a:latin typeface="Arial"/>
+            </a:endParaRPr>
+          </a:p>
+          <a:p>
+            <a:pPr>
+              <a:lnSpc>
+                <a:spcPct val="100000"/>
+              </a:lnSpc>
+            </a:pPr>
+            <a:r>
+              <a:rPr b="1" lang="en-US" sz="1200" spc="-1" strike="noStrike">
+                <a:solidFill>
+                  <a:srgbClr val="0070c0"/>
+                </a:solidFill>
+                <a:latin typeface="Arial"/>
+                <a:ea typeface="DejaVu Sans"/>
+              </a:rPr>
+              <a:t>Or 4 Digital Output </a:t>
+            </a:r>
+            <a:endParaRPr b="0" lang="en-US" sz="1200" spc="-1" strike="noStrike">
+              <a:latin typeface="Arial"/>
+            </a:endParaRPr>
+          </a:p>
         </p:txBody>
       </p:sp>
       <p:sp>
         <p:nvSpPr>
-          <p:cNvPr id="98" name="CustomShape 10"/>
+          <p:cNvPr id="97" name="CustomShape 9"/>
           <p:cNvSpPr/>
           <p:nvPr/>
         </p:nvSpPr>
@@ -11521,7 +11465,7 @@
       </p:sp>
       <p:sp>
         <p:nvSpPr>
-          <p:cNvPr id="99" name="CustomShape 11"/>
+          <p:cNvPr id="98" name="CustomShape 10"/>
           <p:cNvSpPr/>
           <p:nvPr/>
         </p:nvSpPr>
@@ -11570,7 +11514,7 @@
       </p:sp>
       <p:sp>
         <p:nvSpPr>
-          <p:cNvPr id="100" name="CustomShape 12"/>
+          <p:cNvPr id="99" name="CustomShape 11"/>
           <p:cNvSpPr/>
           <p:nvPr/>
         </p:nvSpPr>
@@ -11619,7 +11563,7 @@
       </p:sp>
       <p:pic>
         <p:nvPicPr>
-          <p:cNvPr id="101" name="Picture 39" descr=""/>
+          <p:cNvPr id="100" name="Picture 39" descr=""/>
           <p:cNvPicPr/>
           <p:nvPr/>
         </p:nvPicPr>
@@ -11642,7 +11586,7 @@
       </p:pic>
       <p:sp>
         <p:nvSpPr>
-          <p:cNvPr id="102" name="CustomShape 13"/>
+          <p:cNvPr id="101" name="CustomShape 12"/>
           <p:cNvSpPr/>
           <p:nvPr/>
         </p:nvSpPr>
@@ -11685,7 +11629,7 @@
       </p:sp>
       <p:sp>
         <p:nvSpPr>
-          <p:cNvPr id="103" name="CustomShape 14"/>
+          <p:cNvPr id="102" name="CustomShape 13"/>
           <p:cNvSpPr/>
           <p:nvPr/>
         </p:nvSpPr>
@@ -11728,7 +11672,7 @@
       </p:sp>
       <p:sp>
         <p:nvSpPr>
-          <p:cNvPr id="104" name="CustomShape 15"/>
+          <p:cNvPr id="103" name="CustomShape 14"/>
           <p:cNvSpPr/>
           <p:nvPr/>
         </p:nvSpPr>
@@ -11760,9 +11704,9 @@
               </a:lnSpc>
             </a:pPr>
             <a:r>
-              <a:rPr b="0" lang="en-US" sz="1400" spc="-1" strike="noStrike">
+              <a:rPr b="1" lang="en-US" sz="1400" spc="-1" strike="noStrike">
                 <a:solidFill>
-                  <a:srgbClr val="ff0000"/>
+                  <a:srgbClr val="7030a0"/>
                 </a:solidFill>
                 <a:latin typeface="Arial"/>
                 <a:ea typeface="Arial"/>
@@ -11777,7 +11721,7 @@
       </p:sp>
       <p:sp>
         <p:nvSpPr>
-          <p:cNvPr id="105" name="CustomShape 16"/>
+          <p:cNvPr id="104" name="CustomShape 15"/>
           <p:cNvSpPr/>
           <p:nvPr/>
         </p:nvSpPr>
@@ -11820,7 +11764,7 @@
       </p:sp>
       <p:sp>
         <p:nvSpPr>
-          <p:cNvPr id="106" name="CustomShape 17"/>
+          <p:cNvPr id="105" name="CustomShape 16"/>
           <p:cNvSpPr/>
           <p:nvPr/>
         </p:nvSpPr>
@@ -11863,7 +11807,7 @@
       </p:sp>
       <p:sp>
         <p:nvSpPr>
-          <p:cNvPr id="107" name="CustomShape 18"/>
+          <p:cNvPr id="106" name="CustomShape 17"/>
           <p:cNvSpPr/>
           <p:nvPr/>
         </p:nvSpPr>
@@ -11906,14 +11850,14 @@
       </p:sp>
       <p:sp>
         <p:nvSpPr>
-          <p:cNvPr id="108" name="CustomShape 19"/>
+          <p:cNvPr id="107" name="CustomShape 18"/>
           <p:cNvSpPr/>
           <p:nvPr/>
         </p:nvSpPr>
         <p:spPr>
-          <a:xfrm flipH="1">
-            <a:off x="1710360" y="3181320"/>
-            <a:ext cx="1182600" cy="44640"/>
+          <a:xfrm flipH="1" flipV="1">
+            <a:off x="1523160" y="2976120"/>
+            <a:ext cx="1369800" cy="204120"/>
           </a:xfrm>
           <a:custGeom>
             <a:avLst/>
@@ -11949,14 +11893,14 @@
       </p:sp>
       <p:sp>
         <p:nvSpPr>
-          <p:cNvPr id="109" name="CustomShape 20"/>
+          <p:cNvPr id="108" name="CustomShape 19"/>
           <p:cNvSpPr/>
           <p:nvPr/>
         </p:nvSpPr>
         <p:spPr>
           <a:xfrm flipH="1">
-            <a:off x="1438200" y="3894480"/>
-            <a:ext cx="1401840" cy="124200"/>
+            <a:off x="1294560" y="3894480"/>
+            <a:ext cx="1544760" cy="357840"/>
           </a:xfrm>
           <a:custGeom>
             <a:avLst/>
@@ -11992,7 +11936,7 @@
       </p:sp>
       <p:sp>
         <p:nvSpPr>
-          <p:cNvPr id="110" name="CustomShape 21"/>
+          <p:cNvPr id="109" name="CustomShape 20"/>
           <p:cNvSpPr/>
           <p:nvPr/>
         </p:nvSpPr>
@@ -12035,7 +11979,7 @@
       </p:sp>
       <p:sp>
         <p:nvSpPr>
-          <p:cNvPr id="111" name="CustomShape 22"/>
+          <p:cNvPr id="110" name="CustomShape 21"/>
           <p:cNvSpPr/>
           <p:nvPr/>
         </p:nvSpPr>
@@ -12069,7 +12013,7 @@
             <a:r>
               <a:rPr b="1" lang="en-US" sz="1200" spc="-1" strike="noStrike">
                 <a:solidFill>
-                  <a:srgbClr val="ff0000"/>
+                  <a:srgbClr val="7030a0"/>
                 </a:solidFill>
                 <a:latin typeface="Arial"/>
                 <a:ea typeface="DejaVu Sans"/>
@@ -12081,6 +12025,319 @@
             </a:endParaRPr>
           </a:p>
         </p:txBody>
+      </p:sp>
+      <p:sp>
+        <p:nvSpPr>
+          <p:cNvPr id="111" name="CustomShape 22"/>
+          <p:cNvSpPr/>
+          <p:nvPr/>
+        </p:nvSpPr>
+        <p:spPr>
+          <a:xfrm flipH="1">
+            <a:off x="3154680" y="4252680"/>
+            <a:ext cx="45360" cy="389160"/>
+          </a:xfrm>
+          <a:custGeom>
+            <a:avLst/>
+            <a:gdLst/>
+            <a:ahLst/>
+            <a:rect l="l" t="t" r="r" b="b"/>
+            <a:pathLst>
+              <a:path w="21600" h="21600">
+                <a:moveTo>
+                  <a:pt x="0" y="0"/>
+                </a:moveTo>
+                <a:lnTo>
+                  <a:pt x="21600" y="21600"/>
+                </a:lnTo>
+              </a:path>
+            </a:pathLst>
+          </a:custGeom>
+          <a:noFill/>
+          <a:ln w="28440">
+            <a:solidFill>
+              <a:srgbClr val="00ff00"/>
+            </a:solidFill>
+            <a:round/>
+            <a:tailEnd len="lg" type="triangle" w="lg"/>
+          </a:ln>
+        </p:spPr>
+        <p:style>
+          <a:lnRef idx="0"/>
+          <a:fillRef idx="0"/>
+          <a:effectRef idx="0"/>
+          <a:fontRef idx="minor"/>
+        </p:style>
+      </p:sp>
+      <p:sp>
+        <p:nvSpPr>
+          <p:cNvPr id="112" name="CustomShape 23"/>
+          <p:cNvSpPr/>
+          <p:nvPr/>
+        </p:nvSpPr>
+        <p:spPr>
+          <a:xfrm flipH="1">
+            <a:off x="4267080" y="4249440"/>
+            <a:ext cx="45360" cy="389160"/>
+          </a:xfrm>
+          <a:custGeom>
+            <a:avLst/>
+            <a:gdLst/>
+            <a:ahLst/>
+            <a:rect l="l" t="t" r="r" b="b"/>
+            <a:pathLst>
+              <a:path w="21600" h="21600">
+                <a:moveTo>
+                  <a:pt x="0" y="0"/>
+                </a:moveTo>
+                <a:lnTo>
+                  <a:pt x="21600" y="21600"/>
+                </a:lnTo>
+              </a:path>
+            </a:pathLst>
+          </a:custGeom>
+          <a:noFill/>
+          <a:ln w="28440">
+            <a:solidFill>
+              <a:srgbClr val="00ff00"/>
+            </a:solidFill>
+            <a:round/>
+            <a:tailEnd len="lg" type="triangle" w="lg"/>
+          </a:ln>
+        </p:spPr>
+        <p:style>
+          <a:lnRef idx="0"/>
+          <a:fillRef idx="0"/>
+          <a:effectRef idx="0"/>
+          <a:fontRef idx="minor"/>
+        </p:style>
+      </p:sp>
+      <p:sp>
+        <p:nvSpPr>
+          <p:cNvPr id="113" name="CustomShape 24"/>
+          <p:cNvSpPr/>
+          <p:nvPr/>
+        </p:nvSpPr>
+        <p:spPr>
+          <a:xfrm flipV="1">
+            <a:off x="5608440" y="1656000"/>
+            <a:ext cx="787680" cy="297360"/>
+          </a:xfrm>
+          <a:custGeom>
+            <a:avLst/>
+            <a:gdLst/>
+            <a:ahLst/>
+            <a:rect l="l" t="t" r="r" b="b"/>
+            <a:pathLst>
+              <a:path w="21600" h="21600">
+                <a:moveTo>
+                  <a:pt x="0" y="0"/>
+                </a:moveTo>
+                <a:lnTo>
+                  <a:pt x="21600" y="21600"/>
+                </a:lnTo>
+              </a:path>
+            </a:pathLst>
+          </a:custGeom>
+          <a:noFill/>
+          <a:ln w="28440">
+            <a:solidFill>
+              <a:srgbClr val="00ff00"/>
+            </a:solidFill>
+            <a:round/>
+            <a:tailEnd len="lg" type="triangle" w="lg"/>
+          </a:ln>
+        </p:spPr>
+        <p:style>
+          <a:lnRef idx="0"/>
+          <a:fillRef idx="0"/>
+          <a:effectRef idx="0"/>
+          <a:fontRef idx="minor"/>
+        </p:style>
+      </p:sp>
+      <p:sp>
+        <p:nvSpPr>
+          <p:cNvPr id="114" name="CustomShape 25"/>
+          <p:cNvSpPr/>
+          <p:nvPr/>
+        </p:nvSpPr>
+        <p:spPr>
+          <a:xfrm flipV="1">
+            <a:off x="5755320" y="3830040"/>
+            <a:ext cx="1281960" cy="155520"/>
+          </a:xfrm>
+          <a:custGeom>
+            <a:avLst/>
+            <a:gdLst/>
+            <a:ahLst/>
+            <a:rect l="l" t="t" r="r" b="b"/>
+            <a:pathLst>
+              <a:path w="21600" h="21600">
+                <a:moveTo>
+                  <a:pt x="0" y="0"/>
+                </a:moveTo>
+                <a:lnTo>
+                  <a:pt x="21600" y="21600"/>
+                </a:lnTo>
+              </a:path>
+            </a:pathLst>
+          </a:custGeom>
+          <a:noFill/>
+          <a:ln w="28440">
+            <a:solidFill>
+              <a:srgbClr val="00ff00"/>
+            </a:solidFill>
+            <a:round/>
+            <a:tailEnd len="lg" type="triangle" w="lg"/>
+          </a:ln>
+        </p:spPr>
+        <p:style>
+          <a:lnRef idx="0"/>
+          <a:fillRef idx="0"/>
+          <a:effectRef idx="0"/>
+          <a:fontRef idx="minor"/>
+        </p:style>
+      </p:sp>
+      <p:sp>
+        <p:nvSpPr>
+          <p:cNvPr id="115" name="CustomShape 26"/>
+          <p:cNvSpPr/>
+          <p:nvPr/>
+        </p:nvSpPr>
+        <p:spPr>
+          <a:xfrm>
+            <a:off x="7027560" y="3823560"/>
+            <a:ext cx="786960" cy="348120"/>
+          </a:xfrm>
+          <a:prstGeom prst="rect">
+            <a:avLst/>
+          </a:prstGeom>
+          <a:noFill/>
+          <a:ln>
+            <a:noFill/>
+          </a:ln>
+        </p:spPr>
+        <p:style>
+          <a:lnRef idx="0"/>
+          <a:fillRef idx="0"/>
+          <a:effectRef idx="0"/>
+          <a:fontRef idx="minor"/>
+        </p:style>
+        <p:txBody>
+          <a:bodyPr lIns="90000" rIns="90000" tIns="91440" bIns="91440"/>
+          <a:p>
+            <a:pPr>
+              <a:lnSpc>
+                <a:spcPct val="100000"/>
+              </a:lnSpc>
+            </a:pPr>
+            <a:r>
+              <a:rPr b="1" lang="en-US" sz="1400" spc="-1" strike="noStrike">
+                <a:solidFill>
+                  <a:srgbClr val="ff0000"/>
+                </a:solidFill>
+                <a:latin typeface="Arial"/>
+                <a:ea typeface="Arial"/>
+              </a:rPr>
+              <a:t>RESET</a:t>
+            </a:r>
+            <a:endParaRPr b="0" lang="en-US" sz="1400" spc="-1" strike="noStrike">
+              <a:latin typeface="Arial"/>
+            </a:endParaRPr>
+          </a:p>
+        </p:txBody>
+      </p:sp>
+      <p:sp>
+        <p:nvSpPr>
+          <p:cNvPr id="116" name="CustomShape 27"/>
+          <p:cNvSpPr/>
+          <p:nvPr/>
+        </p:nvSpPr>
+        <p:spPr>
+          <a:xfrm>
+            <a:off x="6858000" y="4453560"/>
+            <a:ext cx="1631160" cy="348120"/>
+          </a:xfrm>
+          <a:prstGeom prst="rect">
+            <a:avLst/>
+          </a:prstGeom>
+          <a:noFill/>
+          <a:ln>
+            <a:noFill/>
+          </a:ln>
+        </p:spPr>
+        <p:style>
+          <a:lnRef idx="0"/>
+          <a:fillRef idx="0"/>
+          <a:effectRef idx="0"/>
+          <a:fontRef idx="minor"/>
+        </p:style>
+        <p:txBody>
+          <a:bodyPr lIns="90000" rIns="90000" tIns="91440" bIns="91440"/>
+          <a:p>
+            <a:pPr>
+              <a:lnSpc>
+                <a:spcPct val="100000"/>
+              </a:lnSpc>
+            </a:pPr>
+            <a:r>
+              <a:rPr b="1" lang="en-US" sz="1400" spc="-1" strike="noStrike">
+                <a:solidFill>
+                  <a:srgbClr val="ff0000"/>
+                </a:solidFill>
+                <a:latin typeface="Arial"/>
+                <a:ea typeface="Arial"/>
+              </a:rPr>
+              <a:t>Interrupt Switch</a:t>
+            </a:r>
+            <a:endParaRPr b="0" lang="en-US" sz="1400" spc="-1" strike="noStrike">
+              <a:latin typeface="Arial"/>
+            </a:endParaRPr>
+          </a:p>
+        </p:txBody>
+      </p:sp>
+      <p:sp>
+        <p:nvSpPr>
+          <p:cNvPr id="117" name="CustomShape 28"/>
+          <p:cNvSpPr/>
+          <p:nvPr/>
+        </p:nvSpPr>
+        <p:spPr>
+          <a:xfrm>
+            <a:off x="5029200" y="4063680"/>
+            <a:ext cx="1828440" cy="582480"/>
+          </a:xfrm>
+          <a:custGeom>
+            <a:avLst/>
+            <a:gdLst/>
+            <a:ahLst/>
+            <a:rect l="l" t="t" r="r" b="b"/>
+            <a:pathLst>
+              <a:path w="21600" h="21600">
+                <a:moveTo>
+                  <a:pt x="0" y="0"/>
+                </a:moveTo>
+                <a:lnTo>
+                  <a:pt x="21600" y="21600"/>
+                </a:lnTo>
+              </a:path>
+            </a:pathLst>
+          </a:custGeom>
+          <a:noFill/>
+          <a:ln w="28440">
+            <a:solidFill>
+              <a:srgbClr val="00ff00"/>
+            </a:solidFill>
+            <a:round/>
+            <a:tailEnd len="lg" type="triangle" w="lg"/>
+          </a:ln>
+        </p:spPr>
+        <p:style>
+          <a:lnRef idx="0"/>
+          <a:fillRef idx="0"/>
+          <a:effectRef idx="0"/>
+          <a:fontRef idx="minor"/>
+        </p:style>
       </p:sp>
     </p:spTree>
   </p:cSld>
@@ -12133,7 +12390,7 @@
       </p:grpSpPr>
       <p:sp>
         <p:nvSpPr>
-          <p:cNvPr id="112" name="CustomShape 1"/>
+          <p:cNvPr id="118" name="CustomShape 1"/>
           <p:cNvSpPr/>
           <p:nvPr/>
         </p:nvSpPr>
@@ -12212,7 +12469,7 @@
       </p:sp>
       <p:sp>
         <p:nvSpPr>
-          <p:cNvPr id="113" name="CustomShape 2"/>
+          <p:cNvPr id="119" name="CustomShape 2"/>
           <p:cNvSpPr/>
           <p:nvPr/>
         </p:nvSpPr>
@@ -12238,7 +12495,7 @@
       </p:sp>
       <p:sp>
         <p:nvSpPr>
-          <p:cNvPr id="114" name="CustomShape 3"/>
+          <p:cNvPr id="120" name="CustomShape 3"/>
           <p:cNvSpPr/>
           <p:nvPr/>
         </p:nvSpPr>
@@ -12264,7 +12521,7 @@
       </p:sp>
       <p:sp>
         <p:nvSpPr>
-          <p:cNvPr id="115" name="CustomShape 4"/>
+          <p:cNvPr id="121" name="CustomShape 4"/>
           <p:cNvSpPr/>
           <p:nvPr/>
         </p:nvSpPr>
@@ -12343,7 +12600,7 @@
       </p:sp>
       <p:pic>
         <p:nvPicPr>
-          <p:cNvPr id="116" name="Picture 2" descr=""/>
+          <p:cNvPr id="122" name="Picture 2" descr=""/>
           <p:cNvPicPr/>
           <p:nvPr/>
         </p:nvPicPr>
@@ -12415,7 +12672,7 @@
       </p:grpSpPr>
       <p:sp>
         <p:nvSpPr>
-          <p:cNvPr id="117" name="CustomShape 1"/>
+          <p:cNvPr id="123" name="CustomShape 1"/>
           <p:cNvSpPr/>
           <p:nvPr/>
         </p:nvSpPr>
@@ -12494,7 +12751,7 @@
       </p:sp>
       <p:sp>
         <p:nvSpPr>
-          <p:cNvPr id="118" name="CustomShape 2"/>
+          <p:cNvPr id="124" name="CustomShape 2"/>
           <p:cNvSpPr/>
           <p:nvPr/>
         </p:nvSpPr>
@@ -12520,7 +12777,7 @@
       </p:sp>
       <p:sp>
         <p:nvSpPr>
-          <p:cNvPr id="119" name="CustomShape 3"/>
+          <p:cNvPr id="125" name="CustomShape 3"/>
           <p:cNvSpPr/>
           <p:nvPr/>
         </p:nvSpPr>
@@ -12546,7 +12803,7 @@
       </p:sp>
       <p:sp>
         <p:nvSpPr>
-          <p:cNvPr id="120" name="CustomShape 4"/>
+          <p:cNvPr id="126" name="CustomShape 4"/>
           <p:cNvSpPr/>
           <p:nvPr/>
         </p:nvSpPr>
@@ -12625,7 +12882,7 @@
       </p:sp>
       <p:pic>
         <p:nvPicPr>
-          <p:cNvPr id="121" name="Picture 2" descr=""/>
+          <p:cNvPr id="127" name="Picture 2" descr=""/>
           <p:cNvPicPr/>
           <p:nvPr/>
         </p:nvPicPr>
@@ -12635,7 +12892,7 @@
         </p:blipFill>
         <p:spPr>
           <a:xfrm>
-            <a:off x="533520" y="1846800"/>
+            <a:off x="317160" y="2187000"/>
             <a:ext cx="3066120" cy="2842200"/>
           </a:xfrm>
           <a:prstGeom prst="rect">
@@ -12648,7 +12905,7 @@
       </p:pic>
       <p:pic>
         <p:nvPicPr>
-          <p:cNvPr id="122" name="Picture 4" descr=""/>
+          <p:cNvPr id="128" name="Picture 4" descr=""/>
           <p:cNvPicPr/>
           <p:nvPr/>
         </p:nvPicPr>
@@ -12658,7 +12915,7 @@
         </p:blipFill>
         <p:spPr>
           <a:xfrm>
-            <a:off x="3962520" y="1765800"/>
+            <a:off x="3931920" y="2181240"/>
             <a:ext cx="4132800" cy="2756520"/>
           </a:xfrm>
           <a:prstGeom prst="rect">
@@ -12671,7 +12928,7 @@
       </p:pic>
       <p:sp>
         <p:nvSpPr>
-          <p:cNvPr id="123" name="CustomShape 5"/>
+          <p:cNvPr id="129" name="CustomShape 5"/>
           <p:cNvSpPr/>
           <p:nvPr/>
         </p:nvSpPr>
@@ -12769,7 +13026,7 @@
       </p:grpSpPr>
       <p:sp>
         <p:nvSpPr>
-          <p:cNvPr id="124" name="CustomShape 1"/>
+          <p:cNvPr id="130" name="CustomShape 1"/>
           <p:cNvSpPr/>
           <p:nvPr/>
         </p:nvSpPr>
@@ -12848,7 +13105,7 @@
       </p:sp>
       <p:sp>
         <p:nvSpPr>
-          <p:cNvPr id="125" name="CustomShape 2"/>
+          <p:cNvPr id="131" name="CustomShape 2"/>
           <p:cNvSpPr/>
           <p:nvPr/>
         </p:nvSpPr>
@@ -12874,7 +13131,7 @@
       </p:sp>
       <p:sp>
         <p:nvSpPr>
-          <p:cNvPr id="126" name="CustomShape 3"/>
+          <p:cNvPr id="132" name="CustomShape 3"/>
           <p:cNvSpPr/>
           <p:nvPr/>
         </p:nvSpPr>
@@ -12900,7 +13157,7 @@
       </p:sp>
       <p:sp>
         <p:nvSpPr>
-          <p:cNvPr id="127" name="CustomShape 4"/>
+          <p:cNvPr id="133" name="CustomShape 4"/>
           <p:cNvSpPr/>
           <p:nvPr/>
         </p:nvSpPr>
@@ -12979,14 +13236,14 @@
       </p:sp>
       <p:sp>
         <p:nvSpPr>
-          <p:cNvPr id="128" name="CustomShape 5"/>
+          <p:cNvPr id="134" name="CustomShape 5"/>
           <p:cNvSpPr/>
           <p:nvPr/>
         </p:nvSpPr>
         <p:spPr>
           <a:xfrm>
-            <a:off x="548640" y="2194560"/>
-            <a:ext cx="2834640" cy="1371600"/>
+            <a:off x="365760" y="2194560"/>
+            <a:ext cx="3749040" cy="2560320"/>
           </a:xfrm>
           <a:prstGeom prst="rect">
             <a:avLst/>
@@ -13011,79 +13268,96 @@
               </a:lnSpc>
             </a:pPr>
             <a:r>
-              <a:rPr b="1" lang="en-US" sz="1300" spc="-1" strike="noStrike">
+              <a:rPr b="1" lang="en-US" sz="1400" spc="-1" strike="noStrike">
                 <a:solidFill>
-                  <a:srgbClr val="00599d"/>
+                  <a:srgbClr val="ff0000"/>
                 </a:solidFill>
                 <a:latin typeface="Arial"/>
                 <a:ea typeface="DejaVu Sans"/>
               </a:rPr>
-              <a:t>For example </a:t>
+              <a:t>For example AT+CWLAP command will scan all WiFi Network,</a:t>
             </a:r>
+            <a:endParaRPr b="1" lang="en-US" sz="1400" spc="-1" strike="noStrike">
+              <a:latin typeface="Arial"/>
+            </a:endParaRPr>
+          </a:p>
+          <a:p>
+            <a:pPr>
+              <a:lnSpc>
+                <a:spcPct val="100000"/>
+              </a:lnSpc>
+            </a:pPr>
+            <a:endParaRPr b="1" lang="en-US" sz="1400" spc="-1" strike="noStrike">
+              <a:latin typeface="Arial"/>
+            </a:endParaRPr>
+          </a:p>
+          <a:p>
+            <a:pPr>
+              <a:lnSpc>
+                <a:spcPct val="100000"/>
+              </a:lnSpc>
+            </a:pPr>
             <a:r>
-              <a:rPr b="1" lang="en-US" sz="1300" spc="-1" strike="noStrike">
+              <a:rPr b="1" lang="en-US" sz="1400" spc="-1" strike="noStrike">
                 <a:solidFill>
-                  <a:srgbClr val="ed1c24"/>
+                  <a:srgbClr val="ff0000"/>
                 </a:solidFill>
                 <a:latin typeface="Arial"/>
                 <a:ea typeface="DejaVu Sans"/>
               </a:rPr>
-              <a:t>AT+CWLAP</a:t>
+              <a:t>  </a:t>
             </a:r>
             <a:r>
-              <a:rPr b="1" lang="en-US" sz="1300" spc="-1" strike="noStrike">
+              <a:rPr b="1" lang="en-US" sz="1400" spc="-1" strike="noStrike">
                 <a:solidFill>
-                  <a:srgbClr val="00599d"/>
+                  <a:srgbClr val="ff0000"/>
                 </a:solidFill>
                 <a:latin typeface="Arial"/>
                 <a:ea typeface="DejaVu Sans"/>
               </a:rPr>
-              <a:t> command will </a:t>
+              <a:t>AT+CWJAP,”Asea”,”lammu” to join a network </a:t>
             </a:r>
+            <a:endParaRPr b="1" lang="en-US" sz="1400" spc="-1" strike="noStrike">
+              <a:latin typeface="Arial"/>
+            </a:endParaRPr>
+          </a:p>
+          <a:p>
+            <a:pPr>
+              <a:lnSpc>
+                <a:spcPct val="100000"/>
+              </a:lnSpc>
+            </a:pPr>
             <a:r>
-              <a:rPr b="1" lang="en-US" sz="1300" spc="-1" strike="noStrike">
+              <a:rPr b="1" lang="en-US" sz="1400" spc="-1" strike="noStrike">
                 <a:solidFill>
-                  <a:srgbClr val="ed1c24"/>
+                  <a:srgbClr val="ff0000"/>
                 </a:solidFill>
                 <a:latin typeface="Arial"/>
                 <a:ea typeface="DejaVu Sans"/>
               </a:rPr>
-              <a:t>scan all WiFi Network</a:t>
+              <a:t>where Asea is name of accesspoint and lammu is password. All AT commands run which are applicable to ESP8266, (Please </a:t>
             </a:r>
             <a:r>
-              <a:rPr b="1" lang="en-US" sz="1300" spc="-1" strike="noStrike">
+              <a:rPr b="1" lang="en-US" sz="1400" spc="-1" strike="noStrike">
                 <a:solidFill>
-                  <a:srgbClr val="00599d"/>
+                  <a:srgbClr val="454fa1"/>
                 </a:solidFill>
                 <a:latin typeface="Arial"/>
                 <a:ea typeface="DejaVu Sans"/>
               </a:rPr>
-              <a:t>,  </a:t>
+              <a:t>do not change default baud rate</a:t>
             </a:r>
             <a:r>
-              <a:rPr b="1" lang="en-US" sz="1300" spc="-1" strike="noStrike">
+              <a:rPr b="1" lang="en-US" sz="1400" spc="-1" strike="noStrike">
                 <a:solidFill>
-                  <a:srgbClr val="ed1c24"/>
+                  <a:srgbClr val="ff0000"/>
                 </a:solidFill>
                 <a:latin typeface="Arial"/>
                 <a:ea typeface="DejaVu Sans"/>
               </a:rPr>
-              <a:t>AT+CWJAP,”Asea”,”lammu”</a:t>
+              <a:t> or communication setting  which is 115200 bps)</a:t>
             </a:r>
-            <a:r>
-              <a:rPr b="1" lang="en-US" sz="1300" spc="-1" strike="noStrike">
-                <a:solidFill>
-                  <a:srgbClr val="00599d"/>
-                </a:solidFill>
-                <a:latin typeface="Arial"/>
-                <a:ea typeface="DejaVu Sans"/>
-              </a:rPr>
-              <a:t> to join a network wherte Asea is name of accesspoint and lammu is password. All AT commands run which are applicable to ESP8266, (Please do not change default baud rate for ESP8266 or communication setting  which is 115200 bps)</a:t>
-            </a:r>
-            <a:endParaRPr b="1" lang="en-US" sz="1300" spc="-1" strike="noStrike">
-              <a:solidFill>
-                <a:srgbClr val="00599d"/>
-              </a:solidFill>
+            <a:endParaRPr b="1" lang="en-US" sz="1400" spc="-1" strike="noStrike">
               <a:latin typeface="Arial"/>
             </a:endParaRPr>
           </a:p>
@@ -13091,7 +13365,7 @@
       </p:sp>
       <p:pic>
         <p:nvPicPr>
-          <p:cNvPr id="129" name="Picture 2" descr=""/>
+          <p:cNvPr id="135" name="Picture 2" descr=""/>
           <p:cNvPicPr/>
           <p:nvPr/>
         </p:nvPicPr>
@@ -13101,7 +13375,7 @@
         </p:blipFill>
         <p:spPr>
           <a:xfrm>
-            <a:off x="3913920" y="2089800"/>
+            <a:off x="4645440" y="2038320"/>
             <a:ext cx="4132800" cy="2756520"/>
           </a:xfrm>
           <a:prstGeom prst="rect">
@@ -13163,7 +13437,7 @@
       </p:grpSpPr>
       <p:sp>
         <p:nvSpPr>
-          <p:cNvPr id="130" name="CustomShape 1"/>
+          <p:cNvPr id="136" name="CustomShape 1"/>
           <p:cNvSpPr/>
           <p:nvPr/>
         </p:nvSpPr>
@@ -13242,7 +13516,7 @@
       </p:sp>
       <p:sp>
         <p:nvSpPr>
-          <p:cNvPr id="131" name="CustomShape 2"/>
+          <p:cNvPr id="137" name="CustomShape 2"/>
           <p:cNvSpPr/>
           <p:nvPr/>
         </p:nvSpPr>
@@ -13268,7 +13542,7 @@
       </p:sp>
       <p:sp>
         <p:nvSpPr>
-          <p:cNvPr id="132" name="CustomShape 3"/>
+          <p:cNvPr id="138" name="CustomShape 3"/>
           <p:cNvSpPr/>
           <p:nvPr/>
         </p:nvSpPr>
@@ -13294,7 +13568,7 @@
       </p:sp>
       <p:sp>
         <p:nvSpPr>
-          <p:cNvPr id="133" name="CustomShape 4"/>
+          <p:cNvPr id="139" name="CustomShape 4"/>
           <p:cNvSpPr/>
           <p:nvPr/>
         </p:nvSpPr>
@@ -13373,7 +13647,7 @@
       </p:sp>
       <p:pic>
         <p:nvPicPr>
-          <p:cNvPr id="134" name="Picture 3" descr=""/>
+          <p:cNvPr id="140" name="Picture 3" descr=""/>
           <p:cNvPicPr/>
           <p:nvPr/>
         </p:nvPicPr>
@@ -13383,7 +13657,7 @@
         </p:blipFill>
         <p:spPr>
           <a:xfrm>
-            <a:off x="4694400" y="2339640"/>
+            <a:off x="4739760" y="2046960"/>
             <a:ext cx="4266720" cy="2598120"/>
           </a:xfrm>
           <a:prstGeom prst="rect">
@@ -13396,7 +13670,7 @@
       </p:pic>
       <p:pic>
         <p:nvPicPr>
-          <p:cNvPr id="135" name="Picture 4" descr=""/>
+          <p:cNvPr id="141" name="Picture 4" descr=""/>
           <p:cNvPicPr/>
           <p:nvPr/>
         </p:nvPicPr>
@@ -13406,8 +13680,8 @@
         </p:blipFill>
         <p:spPr>
           <a:xfrm>
-            <a:off x="308880" y="2560320"/>
-            <a:ext cx="4346280" cy="2250720"/>
+            <a:off x="308880" y="1881000"/>
+            <a:ext cx="4346280" cy="2930040"/>
           </a:xfrm>
           <a:prstGeom prst="rect">
             <a:avLst/>

</xml_diff>

<commit_message>
Thu May 31 08:03:54 EDT 2018
</commit_message>
<xml_diff>
--- a/ppt/wireless.pptx
+++ b/ppt/wireless.pptx
@@ -97,10 +97,8 @@
         <p:txBody>
           <a:bodyPr lIns="0" rIns="0" tIns="0" bIns="0" anchor="ctr"/>
           <a:p>
-            <a:endParaRPr b="0" lang="en-US" sz="1800" spc="-1" strike="noStrike">
-              <a:solidFill>
-                <a:srgbClr val="000000"/>
-              </a:solidFill>
+            <a:pPr algn="ctr"/>
+            <a:endParaRPr b="0" lang="en-US" sz="4400" spc="-1" strike="noStrike">
               <a:latin typeface="Arial"/>
             </a:endParaRPr>
           </a:p>
@@ -130,10 +128,7 @@
             <a:normAutofit/>
           </a:bodyPr>
           <a:p>
-            <a:endParaRPr b="0" lang="en-US" sz="1800" spc="-1" strike="noStrike">
-              <a:solidFill>
-                <a:srgbClr val="000000"/>
-              </a:solidFill>
+            <a:endParaRPr b="0" lang="en-US" sz="3200" spc="-1" strike="noStrike">
               <a:latin typeface="Arial"/>
             </a:endParaRPr>
           </a:p>
@@ -163,10 +158,7 @@
             <a:normAutofit/>
           </a:bodyPr>
           <a:p>
-            <a:endParaRPr b="0" lang="en-US" sz="1800" spc="-1" strike="noStrike">
-              <a:solidFill>
-                <a:srgbClr val="000000"/>
-              </a:solidFill>
+            <a:endParaRPr b="0" lang="en-US" sz="3200" spc="-1" strike="noStrike">
               <a:latin typeface="Arial"/>
             </a:endParaRPr>
           </a:p>
@@ -216,10 +208,8 @@
         <p:txBody>
           <a:bodyPr lIns="0" rIns="0" tIns="0" bIns="0" anchor="ctr"/>
           <a:p>
-            <a:endParaRPr b="0" lang="en-US" sz="1800" spc="-1" strike="noStrike">
-              <a:solidFill>
-                <a:srgbClr val="000000"/>
-              </a:solidFill>
+            <a:pPr algn="ctr"/>
+            <a:endParaRPr b="0" lang="en-US" sz="4400" spc="-1" strike="noStrike">
               <a:latin typeface="Arial"/>
             </a:endParaRPr>
           </a:p>
@@ -249,10 +239,7 @@
             <a:normAutofit/>
           </a:bodyPr>
           <a:p>
-            <a:endParaRPr b="0" lang="en-US" sz="1800" spc="-1" strike="noStrike">
-              <a:solidFill>
-                <a:srgbClr val="000000"/>
-              </a:solidFill>
+            <a:endParaRPr b="0" lang="en-US" sz="3200" spc="-1" strike="noStrike">
               <a:latin typeface="Arial"/>
             </a:endParaRPr>
           </a:p>
@@ -282,10 +269,7 @@
             <a:normAutofit/>
           </a:bodyPr>
           <a:p>
-            <a:endParaRPr b="0" lang="en-US" sz="1800" spc="-1" strike="noStrike">
-              <a:solidFill>
-                <a:srgbClr val="000000"/>
-              </a:solidFill>
+            <a:endParaRPr b="0" lang="en-US" sz="3200" spc="-1" strike="noStrike">
               <a:latin typeface="Arial"/>
             </a:endParaRPr>
           </a:p>
@@ -315,10 +299,7 @@
             <a:normAutofit/>
           </a:bodyPr>
           <a:p>
-            <a:endParaRPr b="0" lang="en-US" sz="1800" spc="-1" strike="noStrike">
-              <a:solidFill>
-                <a:srgbClr val="000000"/>
-              </a:solidFill>
+            <a:endParaRPr b="0" lang="en-US" sz="3200" spc="-1" strike="noStrike">
               <a:latin typeface="Arial"/>
             </a:endParaRPr>
           </a:p>
@@ -348,10 +329,7 @@
             <a:normAutofit/>
           </a:bodyPr>
           <a:p>
-            <a:endParaRPr b="0" lang="en-US" sz="1800" spc="-1" strike="noStrike">
-              <a:solidFill>
-                <a:srgbClr val="000000"/>
-              </a:solidFill>
+            <a:endParaRPr b="0" lang="en-US" sz="3200" spc="-1" strike="noStrike">
               <a:latin typeface="Arial"/>
             </a:endParaRPr>
           </a:p>
@@ -401,10 +379,8 @@
         <p:txBody>
           <a:bodyPr lIns="0" rIns="0" tIns="0" bIns="0" anchor="ctr"/>
           <a:p>
-            <a:endParaRPr b="0" lang="en-US" sz="1800" spc="-1" strike="noStrike">
-              <a:solidFill>
-                <a:srgbClr val="000000"/>
-              </a:solidFill>
+            <a:pPr algn="ctr"/>
+            <a:endParaRPr b="0" lang="en-US" sz="4400" spc="-1" strike="noStrike">
               <a:latin typeface="Arial"/>
             </a:endParaRPr>
           </a:p>
@@ -434,10 +410,7 @@
             <a:normAutofit/>
           </a:bodyPr>
           <a:p>
-            <a:endParaRPr b="0" lang="en-US" sz="1800" spc="-1" strike="noStrike">
-              <a:solidFill>
-                <a:srgbClr val="000000"/>
-              </a:solidFill>
+            <a:endParaRPr b="0" lang="en-US" sz="3200" spc="-1" strike="noStrike">
               <a:latin typeface="Arial"/>
             </a:endParaRPr>
           </a:p>
@@ -467,10 +440,7 @@
             <a:normAutofit/>
           </a:bodyPr>
           <a:p>
-            <a:endParaRPr b="0" lang="en-US" sz="1800" spc="-1" strike="noStrike">
-              <a:solidFill>
-                <a:srgbClr val="000000"/>
-              </a:solidFill>
+            <a:endParaRPr b="0" lang="en-US" sz="3200" spc="-1" strike="noStrike">
               <a:latin typeface="Arial"/>
             </a:endParaRPr>
           </a:p>
@@ -500,10 +470,7 @@
             <a:normAutofit/>
           </a:bodyPr>
           <a:p>
-            <a:endParaRPr b="0" lang="en-US" sz="1800" spc="-1" strike="noStrike">
-              <a:solidFill>
-                <a:srgbClr val="000000"/>
-              </a:solidFill>
+            <a:endParaRPr b="0" lang="en-US" sz="3200" spc="-1" strike="noStrike">
               <a:latin typeface="Arial"/>
             </a:endParaRPr>
           </a:p>
@@ -533,10 +500,7 @@
             <a:normAutofit/>
           </a:bodyPr>
           <a:p>
-            <a:endParaRPr b="0" lang="en-US" sz="1800" spc="-1" strike="noStrike">
-              <a:solidFill>
-                <a:srgbClr val="000000"/>
-              </a:solidFill>
+            <a:endParaRPr b="0" lang="en-US" sz="3200" spc="-1" strike="noStrike">
               <a:latin typeface="Arial"/>
             </a:endParaRPr>
           </a:p>
@@ -566,10 +530,7 @@
             <a:normAutofit/>
           </a:bodyPr>
           <a:p>
-            <a:endParaRPr b="0" lang="en-US" sz="1800" spc="-1" strike="noStrike">
-              <a:solidFill>
-                <a:srgbClr val="000000"/>
-              </a:solidFill>
+            <a:endParaRPr b="0" lang="en-US" sz="3200" spc="-1" strike="noStrike">
               <a:latin typeface="Arial"/>
             </a:endParaRPr>
           </a:p>
@@ -599,10 +560,7 @@
             <a:normAutofit/>
           </a:bodyPr>
           <a:p>
-            <a:endParaRPr b="0" lang="en-US" sz="1800" spc="-1" strike="noStrike">
-              <a:solidFill>
-                <a:srgbClr val="000000"/>
-              </a:solidFill>
+            <a:endParaRPr b="0" lang="en-US" sz="3200" spc="-1" strike="noStrike">
               <a:latin typeface="Arial"/>
             </a:endParaRPr>
           </a:p>
@@ -674,10 +632,8 @@
         <p:txBody>
           <a:bodyPr lIns="0" rIns="0" tIns="0" bIns="0" anchor="ctr"/>
           <a:p>
-            <a:endParaRPr b="0" lang="en-US" sz="1800" spc="-1" strike="noStrike">
-              <a:solidFill>
-                <a:srgbClr val="000000"/>
-              </a:solidFill>
+            <a:pPr algn="ctr"/>
+            <a:endParaRPr b="0" lang="en-US" sz="4400" spc="-1" strike="noStrike">
               <a:latin typeface="Arial"/>
             </a:endParaRPr>
           </a:p>
@@ -756,10 +712,8 @@
         <p:txBody>
           <a:bodyPr lIns="0" rIns="0" tIns="0" bIns="0" anchor="ctr"/>
           <a:p>
-            <a:endParaRPr b="0" lang="en-US" sz="1800" spc="-1" strike="noStrike">
-              <a:solidFill>
-                <a:srgbClr val="000000"/>
-              </a:solidFill>
+            <a:pPr algn="ctr"/>
+            <a:endParaRPr b="0" lang="en-US" sz="4400" spc="-1" strike="noStrike">
               <a:latin typeface="Arial"/>
             </a:endParaRPr>
           </a:p>
@@ -789,10 +743,7 @@
             <a:normAutofit/>
           </a:bodyPr>
           <a:p>
-            <a:endParaRPr b="0" lang="en-US" sz="1800" spc="-1" strike="noStrike">
-              <a:solidFill>
-                <a:srgbClr val="000000"/>
-              </a:solidFill>
+            <a:endParaRPr b="0" lang="en-US" sz="3200" spc="-1" strike="noStrike">
               <a:latin typeface="Arial"/>
             </a:endParaRPr>
           </a:p>
@@ -842,10 +793,8 @@
         <p:txBody>
           <a:bodyPr lIns="0" rIns="0" tIns="0" bIns="0" anchor="ctr"/>
           <a:p>
-            <a:endParaRPr b="0" lang="en-US" sz="1800" spc="-1" strike="noStrike">
-              <a:solidFill>
-                <a:srgbClr val="000000"/>
-              </a:solidFill>
+            <a:pPr algn="ctr"/>
+            <a:endParaRPr b="0" lang="en-US" sz="4400" spc="-1" strike="noStrike">
               <a:latin typeface="Arial"/>
             </a:endParaRPr>
           </a:p>
@@ -875,10 +824,7 @@
             <a:normAutofit/>
           </a:bodyPr>
           <a:p>
-            <a:endParaRPr b="0" lang="en-US" sz="1800" spc="-1" strike="noStrike">
-              <a:solidFill>
-                <a:srgbClr val="000000"/>
-              </a:solidFill>
+            <a:endParaRPr b="0" lang="en-US" sz="3200" spc="-1" strike="noStrike">
               <a:latin typeface="Arial"/>
             </a:endParaRPr>
           </a:p>
@@ -908,10 +854,7 @@
             <a:normAutofit/>
           </a:bodyPr>
           <a:p>
-            <a:endParaRPr b="0" lang="en-US" sz="1800" spc="-1" strike="noStrike">
-              <a:solidFill>
-                <a:srgbClr val="000000"/>
-              </a:solidFill>
+            <a:endParaRPr b="0" lang="en-US" sz="3200" spc="-1" strike="noStrike">
               <a:latin typeface="Arial"/>
             </a:endParaRPr>
           </a:p>
@@ -961,10 +904,8 @@
         <p:txBody>
           <a:bodyPr lIns="0" rIns="0" tIns="0" bIns="0" anchor="ctr"/>
           <a:p>
-            <a:endParaRPr b="0" lang="en-US" sz="1800" spc="-1" strike="noStrike">
-              <a:solidFill>
-                <a:srgbClr val="000000"/>
-              </a:solidFill>
+            <a:pPr algn="ctr"/>
+            <a:endParaRPr b="0" lang="en-US" sz="4400" spc="-1" strike="noStrike">
               <a:latin typeface="Arial"/>
             </a:endParaRPr>
           </a:p>
@@ -1065,10 +1006,8 @@
         <p:txBody>
           <a:bodyPr lIns="0" rIns="0" tIns="0" bIns="0" anchor="ctr"/>
           <a:p>
-            <a:endParaRPr b="0" lang="en-US" sz="1800" spc="-1" strike="noStrike">
-              <a:solidFill>
-                <a:srgbClr val="000000"/>
-              </a:solidFill>
+            <a:pPr algn="ctr"/>
+            <a:endParaRPr b="0" lang="en-US" sz="4400" spc="-1" strike="noStrike">
               <a:latin typeface="Arial"/>
             </a:endParaRPr>
           </a:p>
@@ -1098,10 +1037,7 @@
             <a:normAutofit/>
           </a:bodyPr>
           <a:p>
-            <a:endParaRPr b="0" lang="en-US" sz="1800" spc="-1" strike="noStrike">
-              <a:solidFill>
-                <a:srgbClr val="000000"/>
-              </a:solidFill>
+            <a:endParaRPr b="0" lang="en-US" sz="3200" spc="-1" strike="noStrike">
               <a:latin typeface="Arial"/>
             </a:endParaRPr>
           </a:p>
@@ -1131,10 +1067,7 @@
             <a:normAutofit/>
           </a:bodyPr>
           <a:p>
-            <a:endParaRPr b="0" lang="en-US" sz="1800" spc="-1" strike="noStrike">
-              <a:solidFill>
-                <a:srgbClr val="000000"/>
-              </a:solidFill>
+            <a:endParaRPr b="0" lang="en-US" sz="3200" spc="-1" strike="noStrike">
               <a:latin typeface="Arial"/>
             </a:endParaRPr>
           </a:p>
@@ -1164,10 +1097,7 @@
             <a:normAutofit/>
           </a:bodyPr>
           <a:p>
-            <a:endParaRPr b="0" lang="en-US" sz="1800" spc="-1" strike="noStrike">
-              <a:solidFill>
-                <a:srgbClr val="000000"/>
-              </a:solidFill>
+            <a:endParaRPr b="0" lang="en-US" sz="3200" spc="-1" strike="noStrike">
               <a:latin typeface="Arial"/>
             </a:endParaRPr>
           </a:p>
@@ -1217,10 +1147,8 @@
         <p:txBody>
           <a:bodyPr lIns="0" rIns="0" tIns="0" bIns="0" anchor="ctr"/>
           <a:p>
-            <a:endParaRPr b="0" lang="en-US" sz="1800" spc="-1" strike="noStrike">
-              <a:solidFill>
-                <a:srgbClr val="000000"/>
-              </a:solidFill>
+            <a:pPr algn="ctr"/>
+            <a:endParaRPr b="0" lang="en-US" sz="4400" spc="-1" strike="noStrike">
               <a:latin typeface="Arial"/>
             </a:endParaRPr>
           </a:p>
@@ -1299,10 +1227,8 @@
         <p:txBody>
           <a:bodyPr lIns="0" rIns="0" tIns="0" bIns="0" anchor="ctr"/>
           <a:p>
-            <a:endParaRPr b="0" lang="en-US" sz="1800" spc="-1" strike="noStrike">
-              <a:solidFill>
-                <a:srgbClr val="000000"/>
-              </a:solidFill>
+            <a:pPr algn="ctr"/>
+            <a:endParaRPr b="0" lang="en-US" sz="4400" spc="-1" strike="noStrike">
               <a:latin typeface="Arial"/>
             </a:endParaRPr>
           </a:p>
@@ -1332,10 +1258,7 @@
             <a:normAutofit/>
           </a:bodyPr>
           <a:p>
-            <a:endParaRPr b="0" lang="en-US" sz="1800" spc="-1" strike="noStrike">
-              <a:solidFill>
-                <a:srgbClr val="000000"/>
-              </a:solidFill>
+            <a:endParaRPr b="0" lang="en-US" sz="3200" spc="-1" strike="noStrike">
               <a:latin typeface="Arial"/>
             </a:endParaRPr>
           </a:p>
@@ -1365,10 +1288,7 @@
             <a:normAutofit/>
           </a:bodyPr>
           <a:p>
-            <a:endParaRPr b="0" lang="en-US" sz="1800" spc="-1" strike="noStrike">
-              <a:solidFill>
-                <a:srgbClr val="000000"/>
-              </a:solidFill>
+            <a:endParaRPr b="0" lang="en-US" sz="3200" spc="-1" strike="noStrike">
               <a:latin typeface="Arial"/>
             </a:endParaRPr>
           </a:p>
@@ -1398,10 +1318,7 @@
             <a:normAutofit/>
           </a:bodyPr>
           <a:p>
-            <a:endParaRPr b="0" lang="en-US" sz="1800" spc="-1" strike="noStrike">
-              <a:solidFill>
-                <a:srgbClr val="000000"/>
-              </a:solidFill>
+            <a:endParaRPr b="0" lang="en-US" sz="3200" spc="-1" strike="noStrike">
               <a:latin typeface="Arial"/>
             </a:endParaRPr>
           </a:p>
@@ -1451,10 +1368,8 @@
         <p:txBody>
           <a:bodyPr lIns="0" rIns="0" tIns="0" bIns="0" anchor="ctr"/>
           <a:p>
-            <a:endParaRPr b="0" lang="en-US" sz="1800" spc="-1" strike="noStrike">
-              <a:solidFill>
-                <a:srgbClr val="000000"/>
-              </a:solidFill>
+            <a:pPr algn="ctr"/>
+            <a:endParaRPr b="0" lang="en-US" sz="4400" spc="-1" strike="noStrike">
               <a:latin typeface="Arial"/>
             </a:endParaRPr>
           </a:p>
@@ -1484,10 +1399,7 @@
             <a:normAutofit/>
           </a:bodyPr>
           <a:p>
-            <a:endParaRPr b="0" lang="en-US" sz="1800" spc="-1" strike="noStrike">
-              <a:solidFill>
-                <a:srgbClr val="000000"/>
-              </a:solidFill>
+            <a:endParaRPr b="0" lang="en-US" sz="3200" spc="-1" strike="noStrike">
               <a:latin typeface="Arial"/>
             </a:endParaRPr>
           </a:p>
@@ -1517,10 +1429,7 @@
             <a:normAutofit/>
           </a:bodyPr>
           <a:p>
-            <a:endParaRPr b="0" lang="en-US" sz="1800" spc="-1" strike="noStrike">
-              <a:solidFill>
-                <a:srgbClr val="000000"/>
-              </a:solidFill>
+            <a:endParaRPr b="0" lang="en-US" sz="3200" spc="-1" strike="noStrike">
               <a:latin typeface="Arial"/>
             </a:endParaRPr>
           </a:p>
@@ -1550,10 +1459,7 @@
             <a:normAutofit/>
           </a:bodyPr>
           <a:p>
-            <a:endParaRPr b="0" lang="en-US" sz="1800" spc="-1" strike="noStrike">
-              <a:solidFill>
-                <a:srgbClr val="000000"/>
-              </a:solidFill>
+            <a:endParaRPr b="0" lang="en-US" sz="3200" spc="-1" strike="noStrike">
               <a:latin typeface="Arial"/>
             </a:endParaRPr>
           </a:p>
@@ -1603,10 +1509,8 @@
         <p:txBody>
           <a:bodyPr lIns="0" rIns="0" tIns="0" bIns="0" anchor="ctr"/>
           <a:p>
-            <a:endParaRPr b="0" lang="en-US" sz="1800" spc="-1" strike="noStrike">
-              <a:solidFill>
-                <a:srgbClr val="000000"/>
-              </a:solidFill>
+            <a:pPr algn="ctr"/>
+            <a:endParaRPr b="0" lang="en-US" sz="4400" spc="-1" strike="noStrike">
               <a:latin typeface="Arial"/>
             </a:endParaRPr>
           </a:p>
@@ -1636,10 +1540,7 @@
             <a:normAutofit/>
           </a:bodyPr>
           <a:p>
-            <a:endParaRPr b="0" lang="en-US" sz="1800" spc="-1" strike="noStrike">
-              <a:solidFill>
-                <a:srgbClr val="000000"/>
-              </a:solidFill>
+            <a:endParaRPr b="0" lang="en-US" sz="3200" spc="-1" strike="noStrike">
               <a:latin typeface="Arial"/>
             </a:endParaRPr>
           </a:p>
@@ -1669,10 +1570,7 @@
             <a:normAutofit/>
           </a:bodyPr>
           <a:p>
-            <a:endParaRPr b="0" lang="en-US" sz="1800" spc="-1" strike="noStrike">
-              <a:solidFill>
-                <a:srgbClr val="000000"/>
-              </a:solidFill>
+            <a:endParaRPr b="0" lang="en-US" sz="3200" spc="-1" strike="noStrike">
               <a:latin typeface="Arial"/>
             </a:endParaRPr>
           </a:p>
@@ -1722,10 +1620,8 @@
         <p:txBody>
           <a:bodyPr lIns="0" rIns="0" tIns="0" bIns="0" anchor="ctr"/>
           <a:p>
-            <a:endParaRPr b="0" lang="en-US" sz="1800" spc="-1" strike="noStrike">
-              <a:solidFill>
-                <a:srgbClr val="000000"/>
-              </a:solidFill>
+            <a:pPr algn="ctr"/>
+            <a:endParaRPr b="0" lang="en-US" sz="4400" spc="-1" strike="noStrike">
               <a:latin typeface="Arial"/>
             </a:endParaRPr>
           </a:p>
@@ -1755,10 +1651,7 @@
             <a:normAutofit/>
           </a:bodyPr>
           <a:p>
-            <a:endParaRPr b="0" lang="en-US" sz="1800" spc="-1" strike="noStrike">
-              <a:solidFill>
-                <a:srgbClr val="000000"/>
-              </a:solidFill>
+            <a:endParaRPr b="0" lang="en-US" sz="3200" spc="-1" strike="noStrike">
               <a:latin typeface="Arial"/>
             </a:endParaRPr>
           </a:p>
@@ -1788,10 +1681,7 @@
             <a:normAutofit/>
           </a:bodyPr>
           <a:p>
-            <a:endParaRPr b="0" lang="en-US" sz="1800" spc="-1" strike="noStrike">
-              <a:solidFill>
-                <a:srgbClr val="000000"/>
-              </a:solidFill>
+            <a:endParaRPr b="0" lang="en-US" sz="3200" spc="-1" strike="noStrike">
               <a:latin typeface="Arial"/>
             </a:endParaRPr>
           </a:p>
@@ -1821,10 +1711,7 @@
             <a:normAutofit/>
           </a:bodyPr>
           <a:p>
-            <a:endParaRPr b="0" lang="en-US" sz="1800" spc="-1" strike="noStrike">
-              <a:solidFill>
-                <a:srgbClr val="000000"/>
-              </a:solidFill>
+            <a:endParaRPr b="0" lang="en-US" sz="3200" spc="-1" strike="noStrike">
               <a:latin typeface="Arial"/>
             </a:endParaRPr>
           </a:p>
@@ -1854,10 +1741,7 @@
             <a:normAutofit/>
           </a:bodyPr>
           <a:p>
-            <a:endParaRPr b="0" lang="en-US" sz="1800" spc="-1" strike="noStrike">
-              <a:solidFill>
-                <a:srgbClr val="000000"/>
-              </a:solidFill>
+            <a:endParaRPr b="0" lang="en-US" sz="3200" spc="-1" strike="noStrike">
               <a:latin typeface="Arial"/>
             </a:endParaRPr>
           </a:p>
@@ -1907,10 +1791,8 @@
         <p:txBody>
           <a:bodyPr lIns="0" rIns="0" tIns="0" bIns="0" anchor="ctr"/>
           <a:p>
-            <a:endParaRPr b="0" lang="en-US" sz="1800" spc="-1" strike="noStrike">
-              <a:solidFill>
-                <a:srgbClr val="000000"/>
-              </a:solidFill>
+            <a:pPr algn="ctr"/>
+            <a:endParaRPr b="0" lang="en-US" sz="4400" spc="-1" strike="noStrike">
               <a:latin typeface="Arial"/>
             </a:endParaRPr>
           </a:p>
@@ -1940,10 +1822,7 @@
             <a:normAutofit/>
           </a:bodyPr>
           <a:p>
-            <a:endParaRPr b="0" lang="en-US" sz="1800" spc="-1" strike="noStrike">
-              <a:solidFill>
-                <a:srgbClr val="000000"/>
-              </a:solidFill>
+            <a:endParaRPr b="0" lang="en-US" sz="3200" spc="-1" strike="noStrike">
               <a:latin typeface="Arial"/>
             </a:endParaRPr>
           </a:p>
@@ -1973,10 +1852,7 @@
             <a:normAutofit/>
           </a:bodyPr>
           <a:p>
-            <a:endParaRPr b="0" lang="en-US" sz="1800" spc="-1" strike="noStrike">
-              <a:solidFill>
-                <a:srgbClr val="000000"/>
-              </a:solidFill>
+            <a:endParaRPr b="0" lang="en-US" sz="3200" spc="-1" strike="noStrike">
               <a:latin typeface="Arial"/>
             </a:endParaRPr>
           </a:p>
@@ -2006,10 +1882,7 @@
             <a:normAutofit/>
           </a:bodyPr>
           <a:p>
-            <a:endParaRPr b="0" lang="en-US" sz="1800" spc="-1" strike="noStrike">
-              <a:solidFill>
-                <a:srgbClr val="000000"/>
-              </a:solidFill>
+            <a:endParaRPr b="0" lang="en-US" sz="3200" spc="-1" strike="noStrike">
               <a:latin typeface="Arial"/>
             </a:endParaRPr>
           </a:p>
@@ -2039,10 +1912,7 @@
             <a:normAutofit/>
           </a:bodyPr>
           <a:p>
-            <a:endParaRPr b="0" lang="en-US" sz="1800" spc="-1" strike="noStrike">
-              <a:solidFill>
-                <a:srgbClr val="000000"/>
-              </a:solidFill>
+            <a:endParaRPr b="0" lang="en-US" sz="3200" spc="-1" strike="noStrike">
               <a:latin typeface="Arial"/>
             </a:endParaRPr>
           </a:p>
@@ -2072,10 +1942,7 @@
             <a:normAutofit/>
           </a:bodyPr>
           <a:p>
-            <a:endParaRPr b="0" lang="en-US" sz="1800" spc="-1" strike="noStrike">
-              <a:solidFill>
-                <a:srgbClr val="000000"/>
-              </a:solidFill>
+            <a:endParaRPr b="0" lang="en-US" sz="3200" spc="-1" strike="noStrike">
               <a:latin typeface="Arial"/>
             </a:endParaRPr>
           </a:p>
@@ -2105,10 +1972,7 @@
             <a:normAutofit/>
           </a:bodyPr>
           <a:p>
-            <a:endParaRPr b="0" lang="en-US" sz="1800" spc="-1" strike="noStrike">
-              <a:solidFill>
-                <a:srgbClr val="000000"/>
-              </a:solidFill>
+            <a:endParaRPr b="0" lang="en-US" sz="3200" spc="-1" strike="noStrike">
               <a:latin typeface="Arial"/>
             </a:endParaRPr>
           </a:p>
@@ -2158,10 +2022,8 @@
         <p:txBody>
           <a:bodyPr lIns="0" rIns="0" tIns="0" bIns="0" anchor="ctr"/>
           <a:p>
-            <a:endParaRPr b="0" lang="en-US" sz="1800" spc="-1" strike="noStrike">
-              <a:solidFill>
-                <a:srgbClr val="000000"/>
-              </a:solidFill>
+            <a:pPr algn="ctr"/>
+            <a:endParaRPr b="0" lang="en-US" sz="4400" spc="-1" strike="noStrike">
               <a:latin typeface="Arial"/>
             </a:endParaRPr>
           </a:p>
@@ -2191,10 +2053,7 @@
             <a:normAutofit/>
           </a:bodyPr>
           <a:p>
-            <a:endParaRPr b="0" lang="en-US" sz="1800" spc="-1" strike="noStrike">
-              <a:solidFill>
-                <a:srgbClr val="000000"/>
-              </a:solidFill>
+            <a:endParaRPr b="0" lang="en-US" sz="3200" spc="-1" strike="noStrike">
               <a:latin typeface="Arial"/>
             </a:endParaRPr>
           </a:p>
@@ -2244,10 +2103,8 @@
         <p:txBody>
           <a:bodyPr lIns="0" rIns="0" tIns="0" bIns="0" anchor="ctr"/>
           <a:p>
-            <a:endParaRPr b="0" lang="en-US" sz="1800" spc="-1" strike="noStrike">
-              <a:solidFill>
-                <a:srgbClr val="000000"/>
-              </a:solidFill>
+            <a:pPr algn="ctr"/>
+            <a:endParaRPr b="0" lang="en-US" sz="4400" spc="-1" strike="noStrike">
               <a:latin typeface="Arial"/>
             </a:endParaRPr>
           </a:p>
@@ -2277,10 +2134,7 @@
             <a:normAutofit/>
           </a:bodyPr>
           <a:p>
-            <a:endParaRPr b="0" lang="en-US" sz="1800" spc="-1" strike="noStrike">
-              <a:solidFill>
-                <a:srgbClr val="000000"/>
-              </a:solidFill>
+            <a:endParaRPr b="0" lang="en-US" sz="3200" spc="-1" strike="noStrike">
               <a:latin typeface="Arial"/>
             </a:endParaRPr>
           </a:p>
@@ -2310,10 +2164,7 @@
             <a:normAutofit/>
           </a:bodyPr>
           <a:p>
-            <a:endParaRPr b="0" lang="en-US" sz="1800" spc="-1" strike="noStrike">
-              <a:solidFill>
-                <a:srgbClr val="000000"/>
-              </a:solidFill>
+            <a:endParaRPr b="0" lang="en-US" sz="3200" spc="-1" strike="noStrike">
               <a:latin typeface="Arial"/>
             </a:endParaRPr>
           </a:p>
@@ -2363,10 +2214,8 @@
         <p:txBody>
           <a:bodyPr lIns="0" rIns="0" tIns="0" bIns="0" anchor="ctr"/>
           <a:p>
-            <a:endParaRPr b="0" lang="en-US" sz="1800" spc="-1" strike="noStrike">
-              <a:solidFill>
-                <a:srgbClr val="000000"/>
-              </a:solidFill>
+            <a:pPr algn="ctr"/>
+            <a:endParaRPr b="0" lang="en-US" sz="4400" spc="-1" strike="noStrike">
               <a:latin typeface="Arial"/>
             </a:endParaRPr>
           </a:p>
@@ -2467,10 +2316,8 @@
         <p:txBody>
           <a:bodyPr lIns="0" rIns="0" tIns="0" bIns="0" anchor="ctr"/>
           <a:p>
-            <a:endParaRPr b="0" lang="en-US" sz="1800" spc="-1" strike="noStrike">
-              <a:solidFill>
-                <a:srgbClr val="000000"/>
-              </a:solidFill>
+            <a:pPr algn="ctr"/>
+            <a:endParaRPr b="0" lang="en-US" sz="4400" spc="-1" strike="noStrike">
               <a:latin typeface="Arial"/>
             </a:endParaRPr>
           </a:p>
@@ -2500,10 +2347,7 @@
             <a:normAutofit/>
           </a:bodyPr>
           <a:p>
-            <a:endParaRPr b="0" lang="en-US" sz="1800" spc="-1" strike="noStrike">
-              <a:solidFill>
-                <a:srgbClr val="000000"/>
-              </a:solidFill>
+            <a:endParaRPr b="0" lang="en-US" sz="3200" spc="-1" strike="noStrike">
               <a:latin typeface="Arial"/>
             </a:endParaRPr>
           </a:p>
@@ -2533,10 +2377,7 @@
             <a:normAutofit/>
           </a:bodyPr>
           <a:p>
-            <a:endParaRPr b="0" lang="en-US" sz="1800" spc="-1" strike="noStrike">
-              <a:solidFill>
-                <a:srgbClr val="000000"/>
-              </a:solidFill>
+            <a:endParaRPr b="0" lang="en-US" sz="3200" spc="-1" strike="noStrike">
               <a:latin typeface="Arial"/>
             </a:endParaRPr>
           </a:p>
@@ -2566,10 +2407,7 @@
             <a:normAutofit/>
           </a:bodyPr>
           <a:p>
-            <a:endParaRPr b="0" lang="en-US" sz="1800" spc="-1" strike="noStrike">
-              <a:solidFill>
-                <a:srgbClr val="000000"/>
-              </a:solidFill>
+            <a:endParaRPr b="0" lang="en-US" sz="3200" spc="-1" strike="noStrike">
               <a:latin typeface="Arial"/>
             </a:endParaRPr>
           </a:p>
@@ -2619,10 +2457,8 @@
         <p:txBody>
           <a:bodyPr lIns="0" rIns="0" tIns="0" bIns="0" anchor="ctr"/>
           <a:p>
-            <a:endParaRPr b="0" lang="en-US" sz="1800" spc="-1" strike="noStrike">
-              <a:solidFill>
-                <a:srgbClr val="000000"/>
-              </a:solidFill>
+            <a:pPr algn="ctr"/>
+            <a:endParaRPr b="0" lang="en-US" sz="4400" spc="-1" strike="noStrike">
               <a:latin typeface="Arial"/>
             </a:endParaRPr>
           </a:p>
@@ -2652,10 +2488,7 @@
             <a:normAutofit/>
           </a:bodyPr>
           <a:p>
-            <a:endParaRPr b="0" lang="en-US" sz="1800" spc="-1" strike="noStrike">
-              <a:solidFill>
-                <a:srgbClr val="000000"/>
-              </a:solidFill>
+            <a:endParaRPr b="0" lang="en-US" sz="3200" spc="-1" strike="noStrike">
               <a:latin typeface="Arial"/>
             </a:endParaRPr>
           </a:p>
@@ -2685,10 +2518,7 @@
             <a:normAutofit/>
           </a:bodyPr>
           <a:p>
-            <a:endParaRPr b="0" lang="en-US" sz="1800" spc="-1" strike="noStrike">
-              <a:solidFill>
-                <a:srgbClr val="000000"/>
-              </a:solidFill>
+            <a:endParaRPr b="0" lang="en-US" sz="3200" spc="-1" strike="noStrike">
               <a:latin typeface="Arial"/>
             </a:endParaRPr>
           </a:p>
@@ -2718,10 +2548,7 @@
             <a:normAutofit/>
           </a:bodyPr>
           <a:p>
-            <a:endParaRPr b="0" lang="en-US" sz="1800" spc="-1" strike="noStrike">
-              <a:solidFill>
-                <a:srgbClr val="000000"/>
-              </a:solidFill>
+            <a:endParaRPr b="0" lang="en-US" sz="3200" spc="-1" strike="noStrike">
               <a:latin typeface="Arial"/>
             </a:endParaRPr>
           </a:p>
@@ -2771,10 +2598,8 @@
         <p:txBody>
           <a:bodyPr lIns="0" rIns="0" tIns="0" bIns="0" anchor="ctr"/>
           <a:p>
-            <a:endParaRPr b="0" lang="en-US" sz="1800" spc="-1" strike="noStrike">
-              <a:solidFill>
-                <a:srgbClr val="000000"/>
-              </a:solidFill>
+            <a:pPr algn="ctr"/>
+            <a:endParaRPr b="0" lang="en-US" sz="4400" spc="-1" strike="noStrike">
               <a:latin typeface="Arial"/>
             </a:endParaRPr>
           </a:p>
@@ -2804,10 +2629,7 @@
             <a:normAutofit/>
           </a:bodyPr>
           <a:p>
-            <a:endParaRPr b="0" lang="en-US" sz="1800" spc="-1" strike="noStrike">
-              <a:solidFill>
-                <a:srgbClr val="000000"/>
-              </a:solidFill>
+            <a:endParaRPr b="0" lang="en-US" sz="3200" spc="-1" strike="noStrike">
               <a:latin typeface="Arial"/>
             </a:endParaRPr>
           </a:p>
@@ -2837,10 +2659,7 @@
             <a:normAutofit/>
           </a:bodyPr>
           <a:p>
-            <a:endParaRPr b="0" lang="en-US" sz="1800" spc="-1" strike="noStrike">
-              <a:solidFill>
-                <a:srgbClr val="000000"/>
-              </a:solidFill>
+            <a:endParaRPr b="0" lang="en-US" sz="3200" spc="-1" strike="noStrike">
               <a:latin typeface="Arial"/>
             </a:endParaRPr>
           </a:p>
@@ -2870,10 +2689,7 @@
             <a:normAutofit/>
           </a:bodyPr>
           <a:p>
-            <a:endParaRPr b="0" lang="en-US" sz="1800" spc="-1" strike="noStrike">
-              <a:solidFill>
-                <a:srgbClr val="000000"/>
-              </a:solidFill>
+            <a:endParaRPr b="0" lang="en-US" sz="3200" spc="-1" strike="noStrike">
               <a:latin typeface="Arial"/>
             </a:endParaRPr>
           </a:p>
@@ -2917,7 +2733,7 @@
         <p:spPr>
           <a:xfrm>
             <a:off x="4286160" y="0"/>
-            <a:ext cx="68400" cy="5139360"/>
+            <a:ext cx="68040" cy="5139000"/>
           </a:xfrm>
           <a:prstGeom prst="rect">
             <a:avLst/>
@@ -2945,7 +2761,7 @@
         <p:spPr>
           <a:xfrm>
             <a:off x="4358520" y="0"/>
-            <a:ext cx="3849120" cy="5139360"/>
+            <a:ext cx="3848760" cy="5139000"/>
           </a:xfrm>
           <a:prstGeom prst="rect">
             <a:avLst/>
@@ -2986,19 +2802,56 @@
         <p:txBody>
           <a:bodyPr lIns="0" rIns="0" tIns="0" bIns="0" anchor="ctr"/>
           <a:p>
-            <a:r>
-              <a:rPr b="0" lang="en-US" sz="1800" spc="-1" strike="noStrike">
-                <a:solidFill>
-                  <a:srgbClr val="000000"/>
-                </a:solidFill>
+            <a:pPr algn="ctr"/>
+            <a:r>
+              <a:rPr b="0" lang="en-US" sz="4400" spc="-1" strike="noStrike">
                 <a:latin typeface="Arial"/>
               </a:rPr>
-              <a:t>Click to edit the title text format</a:t>
-            </a:r>
-            <a:endParaRPr b="0" lang="en-US" sz="1800" spc="-1" strike="noStrike">
-              <a:solidFill>
-                <a:srgbClr val="000000"/>
-              </a:solidFill>
+              <a:t>Clic</a:t>
+            </a:r>
+            <a:r>
+              <a:rPr b="0" lang="en-US" sz="4400" spc="-1" strike="noStrike">
+                <a:latin typeface="Arial"/>
+              </a:rPr>
+              <a:t>k to </a:t>
+            </a:r>
+            <a:r>
+              <a:rPr b="0" lang="en-US" sz="4400" spc="-1" strike="noStrike">
+                <a:latin typeface="Arial"/>
+              </a:rPr>
+              <a:t>edit </a:t>
+            </a:r>
+            <a:r>
+              <a:rPr b="0" lang="en-US" sz="4400" spc="-1" strike="noStrike">
+                <a:latin typeface="Arial"/>
+              </a:rPr>
+              <a:t>the </a:t>
+            </a:r>
+            <a:r>
+              <a:rPr b="0" lang="en-US" sz="4400" spc="-1" strike="noStrike">
+                <a:latin typeface="Arial"/>
+              </a:rPr>
+              <a:t>title </a:t>
+            </a:r>
+            <a:r>
+              <a:rPr b="0" lang="en-US" sz="4400" spc="-1" strike="noStrike">
+                <a:latin typeface="Arial"/>
+              </a:rPr>
+              <a:t>text </a:t>
+            </a:r>
+            <a:r>
+              <a:rPr b="0" lang="en-US" sz="4400" spc="-1" strike="noStrike">
+                <a:latin typeface="Arial"/>
+              </a:rPr>
+              <a:t>for</a:t>
+            </a:r>
+            <a:r>
+              <a:rPr b="0" lang="en-US" sz="4400" spc="-1" strike="noStrike">
+                <a:latin typeface="Arial"/>
+              </a:rPr>
+              <a:t>mat</a:t>
+            </a:r>
+            <a:endParaRPr b="0" lang="en-US" sz="4400" spc="-1" strike="noStrike">
               <a:latin typeface="Arial"/>
             </a:endParaRPr>
           </a:p>
@@ -3040,18 +2893,12 @@
               <a:buChar char=""/>
             </a:pPr>
             <a:r>
-              <a:rPr b="0" lang="en-US" sz="1800" spc="-1" strike="noStrike">
-                <a:solidFill>
-                  <a:srgbClr val="000000"/>
-                </a:solidFill>
+              <a:rPr b="0" lang="en-US" sz="3200" spc="-1" strike="noStrike">
                 <a:latin typeface="Arial"/>
               </a:rPr>
               <a:t>Click to edit the outline text format</a:t>
             </a:r>
-            <a:endParaRPr b="0" lang="en-US" sz="1800" spc="-1" strike="noStrike">
-              <a:solidFill>
-                <a:srgbClr val="000000"/>
-              </a:solidFill>
+            <a:endParaRPr b="0" lang="en-US" sz="3200" spc="-1" strike="noStrike">
               <a:latin typeface="Arial"/>
             </a:endParaRPr>
           </a:p>
@@ -3068,18 +2915,12 @@
               <a:buChar char=""/>
             </a:pPr>
             <a:r>
-              <a:rPr b="0" lang="en-US" sz="1800" spc="-1" strike="noStrike">
-                <a:solidFill>
-                  <a:srgbClr val="000000"/>
-                </a:solidFill>
+              <a:rPr b="0" lang="en-US" sz="2800" spc="-1" strike="noStrike">
                 <a:latin typeface="Arial"/>
               </a:rPr>
               <a:t>Second Outline Level</a:t>
             </a:r>
-            <a:endParaRPr b="0" lang="en-US" sz="1800" spc="-1" strike="noStrike">
-              <a:solidFill>
-                <a:srgbClr val="000000"/>
-              </a:solidFill>
+            <a:endParaRPr b="0" lang="en-US" sz="2800" spc="-1" strike="noStrike">
               <a:latin typeface="Arial"/>
             </a:endParaRPr>
           </a:p>
@@ -3096,18 +2937,12 @@
               <a:buChar char=""/>
             </a:pPr>
             <a:r>
-              <a:rPr b="0" lang="en-US" sz="1800" spc="-1" strike="noStrike">
-                <a:solidFill>
-                  <a:srgbClr val="000000"/>
-                </a:solidFill>
+              <a:rPr b="0" lang="en-US" sz="2400" spc="-1" strike="noStrike">
                 <a:latin typeface="Arial"/>
               </a:rPr>
               <a:t>Third Outline Level</a:t>
             </a:r>
-            <a:endParaRPr b="0" lang="en-US" sz="1800" spc="-1" strike="noStrike">
-              <a:solidFill>
-                <a:srgbClr val="000000"/>
-              </a:solidFill>
+            <a:endParaRPr b="0" lang="en-US" sz="2400" spc="-1" strike="noStrike">
               <a:latin typeface="Arial"/>
             </a:endParaRPr>
           </a:p>
@@ -3124,18 +2959,12 @@
               <a:buChar char=""/>
             </a:pPr>
             <a:r>
-              <a:rPr b="0" lang="en-US" sz="1800" spc="-1" strike="noStrike">
-                <a:solidFill>
-                  <a:srgbClr val="000000"/>
-                </a:solidFill>
+              <a:rPr b="0" lang="en-US" sz="2000" spc="-1" strike="noStrike">
                 <a:latin typeface="Arial"/>
               </a:rPr>
               <a:t>Fourth Outline Level</a:t>
             </a:r>
-            <a:endParaRPr b="0" lang="en-US" sz="1800" spc="-1" strike="noStrike">
-              <a:solidFill>
-                <a:srgbClr val="000000"/>
-              </a:solidFill>
+            <a:endParaRPr b="0" lang="en-US" sz="2000" spc="-1" strike="noStrike">
               <a:latin typeface="Arial"/>
             </a:endParaRPr>
           </a:p>
@@ -3153,17 +2982,11 @@
             </a:pPr>
             <a:r>
               <a:rPr b="0" lang="en-US" sz="2000" spc="-1" strike="noStrike">
-                <a:solidFill>
-                  <a:srgbClr val="000000"/>
-                </a:solidFill>
                 <a:latin typeface="Arial"/>
               </a:rPr>
               <a:t>Fifth Outline Level</a:t>
             </a:r>
             <a:endParaRPr b="0" lang="en-US" sz="2000" spc="-1" strike="noStrike">
-              <a:solidFill>
-                <a:srgbClr val="000000"/>
-              </a:solidFill>
               <a:latin typeface="Arial"/>
             </a:endParaRPr>
           </a:p>
@@ -3181,17 +3004,11 @@
             </a:pPr>
             <a:r>
               <a:rPr b="0" lang="en-US" sz="2000" spc="-1" strike="noStrike">
-                <a:solidFill>
-                  <a:srgbClr val="000000"/>
-                </a:solidFill>
                 <a:latin typeface="Arial"/>
               </a:rPr>
               <a:t>Sixth Outline Level</a:t>
             </a:r>
             <a:endParaRPr b="0" lang="en-US" sz="2000" spc="-1" strike="noStrike">
-              <a:solidFill>
-                <a:srgbClr val="000000"/>
-              </a:solidFill>
               <a:latin typeface="Arial"/>
             </a:endParaRPr>
           </a:p>
@@ -3209,17 +3026,11 @@
             </a:pPr>
             <a:r>
               <a:rPr b="0" lang="en-US" sz="2000" spc="-1" strike="noStrike">
-                <a:solidFill>
-                  <a:srgbClr val="000000"/>
-                </a:solidFill>
                 <a:latin typeface="Arial"/>
               </a:rPr>
               <a:t>Seventh Outline Level</a:t>
             </a:r>
             <a:endParaRPr b="0" lang="en-US" sz="2000" spc="-1" strike="noStrike">
-              <a:solidFill>
-                <a:srgbClr val="000000"/>
-              </a:solidFill>
               <a:latin typeface="Arial"/>
             </a:endParaRPr>
           </a:p>
@@ -3291,19 +3102,14 @@
         <p:txBody>
           <a:bodyPr lIns="0" rIns="0" tIns="0" bIns="0" anchor="ctr"/>
           <a:p>
-            <a:r>
-              <a:rPr b="0" lang="en-US" sz="1800" spc="-1" strike="noStrike">
-                <a:solidFill>
-                  <a:srgbClr val="000000"/>
-                </a:solidFill>
+            <a:pPr algn="ctr"/>
+            <a:r>
+              <a:rPr b="0" lang="en-US" sz="4400" spc="-1" strike="noStrike">
                 <a:latin typeface="Arial"/>
               </a:rPr>
               <a:t>Click to edit the title text format</a:t>
             </a:r>
-            <a:endParaRPr b="0" lang="en-US" sz="1800" spc="-1" strike="noStrike">
-              <a:solidFill>
-                <a:srgbClr val="000000"/>
-              </a:solidFill>
+            <a:endParaRPr b="0" lang="en-US" sz="4400" spc="-1" strike="noStrike">
               <a:latin typeface="Arial"/>
             </a:endParaRPr>
           </a:p>
@@ -3345,18 +3151,12 @@
               <a:buChar char=""/>
             </a:pPr>
             <a:r>
-              <a:rPr b="0" lang="en-US" sz="1800" spc="-1" strike="noStrike">
-                <a:solidFill>
-                  <a:srgbClr val="000000"/>
-                </a:solidFill>
+              <a:rPr b="0" lang="en-US" sz="3200" spc="-1" strike="noStrike">
                 <a:latin typeface="Arial"/>
               </a:rPr>
               <a:t>Click to edit the outline text format</a:t>
             </a:r>
-            <a:endParaRPr b="0" lang="en-US" sz="1800" spc="-1" strike="noStrike">
-              <a:solidFill>
-                <a:srgbClr val="000000"/>
-              </a:solidFill>
+            <a:endParaRPr b="0" lang="en-US" sz="3200" spc="-1" strike="noStrike">
               <a:latin typeface="Arial"/>
             </a:endParaRPr>
           </a:p>
@@ -3373,18 +3173,12 @@
               <a:buChar char=""/>
             </a:pPr>
             <a:r>
-              <a:rPr b="0" lang="en-US" sz="1800" spc="-1" strike="noStrike">
-                <a:solidFill>
-                  <a:srgbClr val="000000"/>
-                </a:solidFill>
+              <a:rPr b="0" lang="en-US" sz="2800" spc="-1" strike="noStrike">
                 <a:latin typeface="Arial"/>
               </a:rPr>
               <a:t>Second Outline Level</a:t>
             </a:r>
-            <a:endParaRPr b="0" lang="en-US" sz="1800" spc="-1" strike="noStrike">
-              <a:solidFill>
-                <a:srgbClr val="000000"/>
-              </a:solidFill>
+            <a:endParaRPr b="0" lang="en-US" sz="2800" spc="-1" strike="noStrike">
               <a:latin typeface="Arial"/>
             </a:endParaRPr>
           </a:p>
@@ -3401,18 +3195,12 @@
               <a:buChar char=""/>
             </a:pPr>
             <a:r>
-              <a:rPr b="0" lang="en-US" sz="1800" spc="-1" strike="noStrike">
-                <a:solidFill>
-                  <a:srgbClr val="000000"/>
-                </a:solidFill>
+              <a:rPr b="0" lang="en-US" sz="2400" spc="-1" strike="noStrike">
                 <a:latin typeface="Arial"/>
               </a:rPr>
               <a:t>Third Outline Level</a:t>
             </a:r>
-            <a:endParaRPr b="0" lang="en-US" sz="1800" spc="-1" strike="noStrike">
-              <a:solidFill>
-                <a:srgbClr val="000000"/>
-              </a:solidFill>
+            <a:endParaRPr b="0" lang="en-US" sz="2400" spc="-1" strike="noStrike">
               <a:latin typeface="Arial"/>
             </a:endParaRPr>
           </a:p>
@@ -3429,18 +3217,12 @@
               <a:buChar char=""/>
             </a:pPr>
             <a:r>
-              <a:rPr b="0" lang="en-US" sz="1800" spc="-1" strike="noStrike">
-                <a:solidFill>
-                  <a:srgbClr val="000000"/>
-                </a:solidFill>
+              <a:rPr b="0" lang="en-US" sz="2000" spc="-1" strike="noStrike">
                 <a:latin typeface="Arial"/>
               </a:rPr>
               <a:t>Fourth Outline Level</a:t>
             </a:r>
-            <a:endParaRPr b="0" lang="en-US" sz="1800" spc="-1" strike="noStrike">
-              <a:solidFill>
-                <a:srgbClr val="000000"/>
-              </a:solidFill>
+            <a:endParaRPr b="0" lang="en-US" sz="2000" spc="-1" strike="noStrike">
               <a:latin typeface="Arial"/>
             </a:endParaRPr>
           </a:p>
@@ -3458,17 +3240,11 @@
             </a:pPr>
             <a:r>
               <a:rPr b="0" lang="en-US" sz="2000" spc="-1" strike="noStrike">
-                <a:solidFill>
-                  <a:srgbClr val="000000"/>
-                </a:solidFill>
                 <a:latin typeface="Arial"/>
               </a:rPr>
               <a:t>Fifth Outline Level</a:t>
             </a:r>
             <a:endParaRPr b="0" lang="en-US" sz="2000" spc="-1" strike="noStrike">
-              <a:solidFill>
-                <a:srgbClr val="000000"/>
-              </a:solidFill>
               <a:latin typeface="Arial"/>
             </a:endParaRPr>
           </a:p>
@@ -3486,17 +3262,11 @@
             </a:pPr>
             <a:r>
               <a:rPr b="0" lang="en-US" sz="2000" spc="-1" strike="noStrike">
-                <a:solidFill>
-                  <a:srgbClr val="000000"/>
-                </a:solidFill>
                 <a:latin typeface="Arial"/>
               </a:rPr>
               <a:t>Sixth Outline Level</a:t>
             </a:r>
             <a:endParaRPr b="0" lang="en-US" sz="2000" spc="-1" strike="noStrike">
-              <a:solidFill>
-                <a:srgbClr val="000000"/>
-              </a:solidFill>
               <a:latin typeface="Arial"/>
             </a:endParaRPr>
           </a:p>
@@ -3514,17 +3284,11 @@
             </a:pPr>
             <a:r>
               <a:rPr b="0" lang="en-US" sz="2000" spc="-1" strike="noStrike">
-                <a:solidFill>
-                  <a:srgbClr val="000000"/>
-                </a:solidFill>
                 <a:latin typeface="Arial"/>
               </a:rPr>
               <a:t>Seventh Outline Level</a:t>
             </a:r>
             <a:endParaRPr b="0" lang="en-US" sz="2000" spc="-1" strike="noStrike">
-              <a:solidFill>
-                <a:srgbClr val="000000"/>
-              </a:solidFill>
               <a:latin typeface="Arial"/>
             </a:endParaRPr>
           </a:p>
@@ -3576,7 +3340,7 @@
         <p:spPr>
           <a:xfrm>
             <a:off x="351000" y="971640"/>
-            <a:ext cx="8451720" cy="2594160"/>
+            <a:ext cx="8451360" cy="2593800"/>
           </a:xfrm>
           <a:prstGeom prst="rect">
             <a:avLst/>
@@ -3657,7 +3421,7 @@
         <p:spPr>
           <a:xfrm>
             <a:off x="345960" y="3580920"/>
-            <a:ext cx="8456760" cy="1201680"/>
+            <a:ext cx="8456400" cy="1201320"/>
           </a:xfrm>
           <a:prstGeom prst="rect">
             <a:avLst/>
@@ -3767,7 +3531,7 @@
         <p:spPr>
           <a:xfrm>
             <a:off x="228600" y="285840"/>
-            <a:ext cx="8516520" cy="568800"/>
+            <a:ext cx="8516160" cy="568440"/>
           </a:xfrm>
           <a:prstGeom prst="rect">
             <a:avLst/>
@@ -3836,7 +3600,7 @@
         <p:spPr>
           <a:xfrm>
             <a:off x="311760" y="1017720"/>
-            <a:ext cx="8516520" cy="4056120"/>
+            <a:ext cx="8516160" cy="4055760"/>
           </a:xfrm>
           <a:prstGeom prst="rect">
             <a:avLst/>
@@ -3862,7 +3626,7 @@
         <p:spPr>
           <a:xfrm>
             <a:off x="7625880" y="4425480"/>
-            <a:ext cx="1473120" cy="568800"/>
+            <a:ext cx="1472760" cy="568440"/>
           </a:xfrm>
           <a:prstGeom prst="rect">
             <a:avLst/>
@@ -3888,7 +3652,7 @@
         <p:spPr>
           <a:xfrm>
             <a:off x="938520" y="1014480"/>
-            <a:ext cx="7263000" cy="3630600"/>
+            <a:ext cx="7262640" cy="3630240"/>
           </a:xfrm>
           <a:prstGeom prst="rect">
             <a:avLst/>
@@ -3971,7 +3735,7 @@
         <p:spPr>
           <a:xfrm>
             <a:off x="1143000" y="977760"/>
-            <a:ext cx="6629040" cy="3940200"/>
+            <a:ext cx="6628680" cy="3939840"/>
           </a:xfrm>
           <a:prstGeom prst="rect">
             <a:avLst/>
@@ -4039,7 +3803,7 @@
         <p:spPr>
           <a:xfrm>
             <a:off x="228600" y="285840"/>
-            <a:ext cx="8516520" cy="568800"/>
+            <a:ext cx="8516160" cy="568440"/>
           </a:xfrm>
           <a:prstGeom prst="rect">
             <a:avLst/>
@@ -4178,7 +3942,7 @@
         <p:spPr>
           <a:xfrm>
             <a:off x="311760" y="1017720"/>
-            <a:ext cx="8516520" cy="4056120"/>
+            <a:ext cx="8516160" cy="4055760"/>
           </a:xfrm>
           <a:prstGeom prst="rect">
             <a:avLst/>
@@ -4204,7 +3968,7 @@
         <p:spPr>
           <a:xfrm>
             <a:off x="7625880" y="4425480"/>
-            <a:ext cx="1473120" cy="568800"/>
+            <a:ext cx="1472760" cy="568440"/>
           </a:xfrm>
           <a:prstGeom prst="rect">
             <a:avLst/>
@@ -4230,7 +3994,7 @@
         <p:spPr>
           <a:xfrm>
             <a:off x="938520" y="1014480"/>
-            <a:ext cx="7263000" cy="3630600"/>
+            <a:ext cx="7262640" cy="3630240"/>
           </a:xfrm>
           <a:prstGeom prst="rect">
             <a:avLst/>
@@ -4313,7 +4077,7 @@
         <p:spPr>
           <a:xfrm>
             <a:off x="311760" y="2285640"/>
-            <a:ext cx="4959000" cy="2651400"/>
+            <a:ext cx="4958640" cy="2651040"/>
           </a:xfrm>
           <a:prstGeom prst="rect">
             <a:avLst/>
@@ -4336,7 +4100,7 @@
         <p:spPr>
           <a:xfrm>
             <a:off x="5394960" y="2359800"/>
-            <a:ext cx="3521520" cy="2285280"/>
+            <a:ext cx="3521160" cy="2284920"/>
           </a:xfrm>
           <a:prstGeom prst="rect">
             <a:avLst/>
@@ -4404,7 +4168,7 @@
         <p:spPr>
           <a:xfrm>
             <a:off x="228600" y="285840"/>
-            <a:ext cx="8516520" cy="568800"/>
+            <a:ext cx="8516160" cy="568440"/>
           </a:xfrm>
           <a:prstGeom prst="rect">
             <a:avLst/>
@@ -4563,7 +4327,7 @@
         <p:spPr>
           <a:xfrm>
             <a:off x="311760" y="1017720"/>
-            <a:ext cx="8516520" cy="4056120"/>
+            <a:ext cx="8516160" cy="4055760"/>
           </a:xfrm>
           <a:prstGeom prst="rect">
             <a:avLst/>
@@ -4589,7 +4353,7 @@
         <p:spPr>
           <a:xfrm>
             <a:off x="7625880" y="4425480"/>
-            <a:ext cx="1473120" cy="568800"/>
+            <a:ext cx="1472760" cy="568440"/>
           </a:xfrm>
           <a:prstGeom prst="rect">
             <a:avLst/>
@@ -4615,7 +4379,7 @@
         <p:spPr>
           <a:xfrm>
             <a:off x="938520" y="1014480"/>
-            <a:ext cx="7263000" cy="3630600"/>
+            <a:ext cx="7262640" cy="3630240"/>
           </a:xfrm>
           <a:prstGeom prst="rect">
             <a:avLst/>
@@ -4743,7 +4507,7 @@
         <p:spPr>
           <a:xfrm>
             <a:off x="228600" y="285840"/>
-            <a:ext cx="8516520" cy="568800"/>
+            <a:ext cx="8516160" cy="568440"/>
           </a:xfrm>
           <a:prstGeom prst="rect">
             <a:avLst/>
@@ -4775,7 +4539,7 @@
                 <a:latin typeface="Oswald"/>
                 <a:ea typeface="Oswald"/>
               </a:rPr>
-              <a:t>Windows app</a:t>
+              <a:t>Windows/Linux app</a:t>
             </a:r>
             <a:endParaRPr b="0" lang="en-US" sz="3000" spc="-1" strike="noStrike">
               <a:latin typeface="Arial"/>
@@ -4802,7 +4566,7 @@
         <p:spPr>
           <a:xfrm>
             <a:off x="311760" y="1017720"/>
-            <a:ext cx="8516520" cy="4056120"/>
+            <a:ext cx="8516160" cy="4055760"/>
           </a:xfrm>
           <a:prstGeom prst="rect">
             <a:avLst/>
@@ -4828,7 +4592,7 @@
         <p:spPr>
           <a:xfrm>
             <a:off x="7625880" y="4425480"/>
-            <a:ext cx="1473120" cy="568800"/>
+            <a:ext cx="1472760" cy="568440"/>
           </a:xfrm>
           <a:prstGeom prst="rect">
             <a:avLst/>
@@ -4857,8 +4621,8 @@
         </p:blipFill>
         <p:spPr>
           <a:xfrm>
-            <a:off x="152280" y="2343240"/>
-            <a:ext cx="3021480" cy="2185560"/>
+            <a:off x="545040" y="2343240"/>
+            <a:ext cx="3021120" cy="2185200"/>
           </a:xfrm>
           <a:prstGeom prst="rect">
             <a:avLst/>
@@ -4877,7 +4641,7 @@
         <p:spPr>
           <a:xfrm>
             <a:off x="500760" y="1123920"/>
-            <a:ext cx="8576640" cy="913320"/>
+            <a:ext cx="8576280" cy="912960"/>
           </a:xfrm>
           <a:prstGeom prst="rect">
             <a:avLst/>
@@ -4959,7 +4723,7 @@
       </p:sp>
       <p:pic>
         <p:nvPicPr>
-          <p:cNvPr id="162" name="Picture 2" descr=""/>
+          <p:cNvPr id="162" name="" descr=""/>
           <p:cNvPicPr/>
           <p:nvPr/>
         </p:nvPicPr>
@@ -4969,8 +4733,8 @@
         </p:blipFill>
         <p:spPr>
           <a:xfrm>
-            <a:off x="3581280" y="1902240"/>
-            <a:ext cx="4973400" cy="3171600"/>
+            <a:off x="3840480" y="2004840"/>
+            <a:ext cx="4679640" cy="2932920"/>
           </a:xfrm>
           <a:prstGeom prst="rect">
             <a:avLst/>
@@ -5038,7 +4802,7 @@
         <p:spPr>
           <a:xfrm>
             <a:off x="228600" y="285840"/>
-            <a:ext cx="8516520" cy="568800"/>
+            <a:ext cx="8516160" cy="568440"/>
           </a:xfrm>
           <a:prstGeom prst="rect">
             <a:avLst/>
@@ -5097,7 +4861,7 @@
         <p:spPr>
           <a:xfrm>
             <a:off x="311760" y="1017720"/>
-            <a:ext cx="8516520" cy="4056120"/>
+            <a:ext cx="8516160" cy="4055760"/>
           </a:xfrm>
           <a:prstGeom prst="rect">
             <a:avLst/>
@@ -5123,7 +4887,7 @@
         <p:spPr>
           <a:xfrm>
             <a:off x="7625880" y="4425480"/>
-            <a:ext cx="1473120" cy="568800"/>
+            <a:ext cx="1472760" cy="568440"/>
           </a:xfrm>
           <a:prstGeom prst="rect">
             <a:avLst/>
@@ -5153,7 +4917,7 @@
         <p:spPr>
           <a:xfrm>
             <a:off x="311760" y="2419200"/>
-            <a:ext cx="2376000" cy="1831680"/>
+            <a:ext cx="2375640" cy="1831320"/>
           </a:xfrm>
           <a:prstGeom prst="rect">
             <a:avLst/>
@@ -5176,7 +4940,7 @@
         <p:spPr>
           <a:xfrm>
             <a:off x="2971800" y="1276200"/>
-            <a:ext cx="5676480" cy="3619800"/>
+            <a:ext cx="5676120" cy="3619440"/>
           </a:xfrm>
           <a:prstGeom prst="rect">
             <a:avLst/>
@@ -5244,7 +5008,7 @@
         <p:spPr>
           <a:xfrm>
             <a:off x="228600" y="285840"/>
-            <a:ext cx="8516520" cy="568800"/>
+            <a:ext cx="8516160" cy="568440"/>
           </a:xfrm>
           <a:prstGeom prst="rect">
             <a:avLst/>
@@ -5303,7 +5067,7 @@
         <p:spPr>
           <a:xfrm>
             <a:off x="311760" y="1017720"/>
-            <a:ext cx="8516520" cy="4056120"/>
+            <a:ext cx="8516160" cy="4055760"/>
           </a:xfrm>
           <a:prstGeom prst="rect">
             <a:avLst/>
@@ -5329,7 +5093,7 @@
         <p:spPr>
           <a:xfrm>
             <a:off x="7625880" y="4425480"/>
-            <a:ext cx="1473120" cy="568800"/>
+            <a:ext cx="1472760" cy="568440"/>
           </a:xfrm>
           <a:prstGeom prst="rect">
             <a:avLst/>
@@ -5355,7 +5119,7 @@
         <p:spPr>
           <a:xfrm>
             <a:off x="938520" y="1014480"/>
-            <a:ext cx="7263000" cy="3630600"/>
+            <a:ext cx="7262640" cy="3630240"/>
           </a:xfrm>
           <a:prstGeom prst="rect">
             <a:avLst/>
@@ -5583,7 +5347,7 @@
         <p:spPr>
           <a:xfrm>
             <a:off x="311760" y="89280"/>
-            <a:ext cx="8516520" cy="568800"/>
+            <a:ext cx="8516160" cy="568440"/>
           </a:xfrm>
           <a:prstGeom prst="rect">
             <a:avLst/>
@@ -5632,7 +5396,7 @@
         <p:spPr>
           <a:xfrm>
             <a:off x="358200" y="662040"/>
-            <a:ext cx="8516520" cy="4370760"/>
+            <a:ext cx="8516160" cy="4370400"/>
           </a:xfrm>
           <a:prstGeom prst="rect">
             <a:avLst/>
@@ -5695,7 +5459,7 @@
         <p:spPr>
           <a:xfrm>
             <a:off x="1806120" y="784440"/>
-            <a:ext cx="605520" cy="438840"/>
+            <a:ext cx="605160" cy="438480"/>
           </a:xfrm>
           <a:prstGeom prst="rect">
             <a:avLst/>
@@ -5714,7 +5478,7 @@
         <p:spPr>
           <a:xfrm>
             <a:off x="3200400" y="1581120"/>
-            <a:ext cx="9140040" cy="453240"/>
+            <a:ext cx="9139680" cy="452880"/>
           </a:xfrm>
           <a:prstGeom prst="rect">
             <a:avLst/>
@@ -5739,7 +5503,7 @@
         </p:nvGraphicFramePr>
         <p:xfrm>
           <a:off x="838080" y="1352520"/>
-          <a:ext cx="7543080" cy="3242160"/>
+          <a:ext cx="7543080" cy="3241800"/>
         </p:xfrm>
         <a:graphic>
           <a:graphicData uri="http://schemas.openxmlformats.org/drawingml/2006/table">
@@ -6978,7 +6742,7 @@
                   </a:tcPr>
                 </a:tc>
               </a:tr>
-              <a:tr h="287640">
+              <a:tr h="287280">
                 <a:tc>
                   <a:txBody>
                     <a:bodyPr/>
@@ -7147,7 +6911,7 @@
         <p:spPr>
           <a:xfrm>
             <a:off x="6172200" y="743040"/>
-            <a:ext cx="883080" cy="608400"/>
+            <a:ext cx="882720" cy="608040"/>
           </a:xfrm>
           <a:prstGeom prst="rect">
             <a:avLst/>
@@ -7215,7 +6979,7 @@
         <p:spPr>
           <a:xfrm>
             <a:off x="311760" y="89280"/>
-            <a:ext cx="8516520" cy="568800"/>
+            <a:ext cx="8516160" cy="568440"/>
           </a:xfrm>
           <a:prstGeom prst="rect">
             <a:avLst/>
@@ -7264,7 +7028,7 @@
         <p:spPr>
           <a:xfrm>
             <a:off x="358200" y="662040"/>
-            <a:ext cx="8516520" cy="4370760"/>
+            <a:ext cx="8516160" cy="4370400"/>
           </a:xfrm>
           <a:prstGeom prst="rect">
             <a:avLst/>
@@ -7294,7 +7058,7 @@
         <p:spPr>
           <a:xfrm>
             <a:off x="1806120" y="784440"/>
-            <a:ext cx="605520" cy="438840"/>
+            <a:ext cx="605160" cy="438480"/>
           </a:xfrm>
           <a:prstGeom prst="rect">
             <a:avLst/>
@@ -7313,7 +7077,7 @@
         <p:spPr>
           <a:xfrm>
             <a:off x="3200400" y="1581120"/>
-            <a:ext cx="9140040" cy="453240"/>
+            <a:ext cx="9139680" cy="452880"/>
           </a:xfrm>
           <a:prstGeom prst="rect">
             <a:avLst/>
@@ -8434,7 +8198,7 @@
         <p:spPr>
           <a:xfrm>
             <a:off x="990720" y="3943440"/>
-            <a:ext cx="7463520" cy="299880"/>
+            <a:ext cx="7463160" cy="299520"/>
           </a:xfrm>
           <a:prstGeom prst="rect">
             <a:avLst/>
@@ -8483,7 +8247,7 @@
         <p:spPr>
           <a:xfrm>
             <a:off x="1219320" y="3935160"/>
-            <a:ext cx="7161480" cy="637920"/>
+            <a:ext cx="7161120" cy="637560"/>
           </a:xfrm>
           <a:prstGeom prst="rect">
             <a:avLst/>
@@ -8552,7 +8316,7 @@
         <p:spPr>
           <a:xfrm>
             <a:off x="6248520" y="667440"/>
-            <a:ext cx="806760" cy="555840"/>
+            <a:ext cx="806400" cy="555480"/>
           </a:xfrm>
           <a:prstGeom prst="rect">
             <a:avLst/>
@@ -8620,7 +8384,7 @@
         <p:spPr>
           <a:xfrm>
             <a:off x="311760" y="147600"/>
-            <a:ext cx="8516520" cy="568800"/>
+            <a:ext cx="8516160" cy="568440"/>
           </a:xfrm>
           <a:prstGeom prst="rect">
             <a:avLst/>
@@ -8679,7 +8443,7 @@
         <p:spPr>
           <a:xfrm>
             <a:off x="311760" y="1017720"/>
-            <a:ext cx="8516520" cy="3547080"/>
+            <a:ext cx="8516160" cy="3546720"/>
           </a:xfrm>
           <a:prstGeom prst="rect">
             <a:avLst/>
@@ -8709,7 +8473,7 @@
         <p:spPr>
           <a:xfrm>
             <a:off x="1143000" y="738000"/>
-            <a:ext cx="6615720" cy="4310640"/>
+            <a:ext cx="6615360" cy="4310280"/>
           </a:xfrm>
           <a:prstGeom prst="rect">
             <a:avLst/>
@@ -8777,7 +8541,7 @@
         <p:spPr>
           <a:xfrm>
             <a:off x="311760" y="147600"/>
-            <a:ext cx="8516520" cy="568800"/>
+            <a:ext cx="8516160" cy="568440"/>
           </a:xfrm>
           <a:prstGeom prst="rect">
             <a:avLst/>
@@ -8836,7 +8600,7 @@
         <p:spPr>
           <a:xfrm>
             <a:off x="311760" y="1017720"/>
-            <a:ext cx="8516520" cy="3547080"/>
+            <a:ext cx="8516160" cy="3546720"/>
           </a:xfrm>
           <a:prstGeom prst="rect">
             <a:avLst/>
@@ -8866,7 +8630,7 @@
         <p:spPr>
           <a:xfrm>
             <a:off x="1234440" y="744120"/>
-            <a:ext cx="6615720" cy="4310640"/>
+            <a:ext cx="6615360" cy="4310280"/>
           </a:xfrm>
           <a:prstGeom prst="rect">
             <a:avLst/>
@@ -8934,7 +8698,7 @@
         <p:spPr>
           <a:xfrm>
             <a:off x="228600" y="209520"/>
-            <a:ext cx="8516520" cy="568800"/>
+            <a:ext cx="8516160" cy="568440"/>
           </a:xfrm>
           <a:prstGeom prst="rect">
             <a:avLst/>
@@ -8993,7 +8757,7 @@
         <p:spPr>
           <a:xfrm>
             <a:off x="311760" y="1017720"/>
-            <a:ext cx="8516520" cy="4056120"/>
+            <a:ext cx="8516160" cy="4055760"/>
           </a:xfrm>
           <a:prstGeom prst="rect">
             <a:avLst/>
@@ -9019,7 +8783,7 @@
         <p:spPr>
           <a:xfrm>
             <a:off x="341640" y="814680"/>
-            <a:ext cx="8343000" cy="3630600"/>
+            <a:ext cx="8342640" cy="3630240"/>
           </a:xfrm>
           <a:prstGeom prst="rect">
             <a:avLst/>
@@ -9297,7 +9061,7 @@
         <p:spPr>
           <a:xfrm>
             <a:off x="311760" y="147600"/>
-            <a:ext cx="8516520" cy="568800"/>
+            <a:ext cx="8516160" cy="568440"/>
           </a:xfrm>
           <a:prstGeom prst="rect">
             <a:avLst/>
@@ -9356,7 +9120,7 @@
         <p:spPr>
           <a:xfrm>
             <a:off x="311760" y="1017720"/>
-            <a:ext cx="8516520" cy="3547080"/>
+            <a:ext cx="8516160" cy="3546720"/>
           </a:xfrm>
           <a:prstGeom prst="rect">
             <a:avLst/>
@@ -9386,7 +9150,7 @@
         <p:spPr>
           <a:xfrm>
             <a:off x="1262520" y="831960"/>
-            <a:ext cx="6615360" cy="4310280"/>
+            <a:ext cx="6615000" cy="4309920"/>
           </a:xfrm>
           <a:prstGeom prst="rect">
             <a:avLst/>
@@ -9454,7 +9218,7 @@
         <p:spPr>
           <a:xfrm>
             <a:off x="311760" y="444960"/>
-            <a:ext cx="8516520" cy="568800"/>
+            <a:ext cx="8516160" cy="568440"/>
           </a:xfrm>
           <a:prstGeom prst="rect">
             <a:avLst/>
@@ -9513,7 +9277,7 @@
         <p:spPr>
           <a:xfrm>
             <a:off x="311760" y="1017720"/>
-            <a:ext cx="8516520" cy="3547080"/>
+            <a:ext cx="8516160" cy="3546720"/>
           </a:xfrm>
           <a:prstGeom prst="rect">
             <a:avLst/>
@@ -9543,7 +9307,7 @@
         <p:spPr>
           <a:xfrm>
             <a:off x="1905120" y="1078200"/>
-            <a:ext cx="5104080" cy="3854160"/>
+            <a:ext cx="5103720" cy="3853800"/>
           </a:xfrm>
           <a:prstGeom prst="rect">
             <a:avLst/>
@@ -9611,7 +9375,7 @@
         <p:spPr>
           <a:xfrm>
             <a:off x="311760" y="444960"/>
-            <a:ext cx="8516520" cy="568800"/>
+            <a:ext cx="8516160" cy="568440"/>
           </a:xfrm>
           <a:prstGeom prst="rect">
             <a:avLst/>
@@ -9670,7 +9434,7 @@
         <p:spPr>
           <a:xfrm>
             <a:off x="311760" y="1017720"/>
-            <a:ext cx="8516520" cy="3547080"/>
+            <a:ext cx="8516160" cy="3546720"/>
           </a:xfrm>
           <a:prstGeom prst="rect">
             <a:avLst/>
@@ -9700,7 +9464,7 @@
         <p:spPr>
           <a:xfrm>
             <a:off x="2286000" y="1175040"/>
-            <a:ext cx="4815360" cy="3878640"/>
+            <a:ext cx="4815000" cy="3878280"/>
           </a:xfrm>
           <a:prstGeom prst="rect">
             <a:avLst/>
@@ -9768,7 +9532,7 @@
         <p:spPr>
           <a:xfrm>
             <a:off x="311760" y="444960"/>
-            <a:ext cx="8516520" cy="568800"/>
+            <a:ext cx="8516160" cy="568440"/>
           </a:xfrm>
           <a:prstGeom prst="rect">
             <a:avLst/>
@@ -9827,7 +9591,7 @@
         <p:spPr>
           <a:xfrm>
             <a:off x="311760" y="1017720"/>
-            <a:ext cx="8516520" cy="3547080"/>
+            <a:ext cx="8516160" cy="3546720"/>
           </a:xfrm>
           <a:prstGeom prst="rect">
             <a:avLst/>
@@ -9846,7 +9610,7 @@
         <p:txBody>
           <a:bodyPr lIns="90000" rIns="90000" tIns="91440" bIns="91440"/>
           <a:p>
-            <a:pPr marL="457200" indent="-224640">
+            <a:pPr marL="457200" indent="-224280">
               <a:lnSpc>
                 <a:spcPct val="100000"/>
               </a:lnSpc>
@@ -9891,7 +9655,7 @@
             </a:endParaRPr>
           </a:p>
           <a:p>
-            <a:pPr marL="457200" indent="-224640">
+            <a:pPr marL="457200" indent="-224280">
               <a:lnSpc>
                 <a:spcPct val="100000"/>
               </a:lnSpc>
@@ -9946,7 +9710,7 @@
             </a:endParaRPr>
           </a:p>
           <a:p>
-            <a:pPr marL="457200" indent="-224640">
+            <a:pPr marL="457200" indent="-224280">
               <a:lnSpc>
                 <a:spcPct val="100000"/>
               </a:lnSpc>
@@ -10001,7 +9765,7 @@
             </a:endParaRPr>
           </a:p>
           <a:p>
-            <a:pPr marL="457200" indent="-224640">
+            <a:pPr marL="457200" indent="-224280">
               <a:lnSpc>
                 <a:spcPct val="100000"/>
               </a:lnSpc>
@@ -10026,7 +9790,7 @@
             </a:endParaRPr>
           </a:p>
           <a:p>
-            <a:pPr marL="457200" indent="-224640">
+            <a:pPr marL="457200" indent="-224280">
               <a:lnSpc>
                 <a:spcPct val="100000"/>
               </a:lnSpc>
@@ -10180,7 +9944,7 @@
         <p:spPr>
           <a:xfrm>
             <a:off x="311760" y="444960"/>
-            <a:ext cx="8516520" cy="568800"/>
+            <a:ext cx="8516160" cy="568440"/>
           </a:xfrm>
           <a:prstGeom prst="rect">
             <a:avLst/>
@@ -10239,7 +10003,7 @@
         <p:spPr>
           <a:xfrm>
             <a:off x="311760" y="1017720"/>
-            <a:ext cx="8516520" cy="3547080"/>
+            <a:ext cx="8516160" cy="3546720"/>
           </a:xfrm>
           <a:prstGeom prst="rect">
             <a:avLst/>
@@ -10288,7 +10052,7 @@
             </a:endParaRPr>
           </a:p>
           <a:p>
-            <a:pPr marL="457200" indent="-224640">
+            <a:pPr marL="457200" indent="-224280">
               <a:lnSpc>
                 <a:spcPct val="100000"/>
               </a:lnSpc>
@@ -10313,7 +10077,7 @@
             </a:endParaRPr>
           </a:p>
           <a:p>
-            <a:pPr marL="457200" indent="-224640">
+            <a:pPr marL="457200" indent="-224280">
               <a:lnSpc>
                 <a:spcPct val="100000"/>
               </a:lnSpc>
@@ -10338,7 +10102,7 @@
             </a:endParaRPr>
           </a:p>
           <a:p>
-            <a:pPr marL="457200" indent="-224640">
+            <a:pPr marL="457200" indent="-224280">
               <a:lnSpc>
                 <a:spcPct val="100000"/>
               </a:lnSpc>
@@ -10363,7 +10127,7 @@
             </a:endParaRPr>
           </a:p>
           <a:p>
-            <a:pPr marL="457200" indent="-224640">
+            <a:pPr marL="457200" indent="-224280">
               <a:lnSpc>
                 <a:spcPct val="100000"/>
               </a:lnSpc>
@@ -10388,7 +10152,7 @@
             </a:endParaRPr>
           </a:p>
           <a:p>
-            <a:pPr marL="457200" indent="-224640">
+            <a:pPr marL="457200" indent="-224280">
               <a:lnSpc>
                 <a:spcPct val="100000"/>
               </a:lnSpc>
@@ -10453,7 +10217,7 @@
             </a:endParaRPr>
           </a:p>
           <a:p>
-            <a:pPr marL="457200" indent="-224640">
+            <a:pPr marL="457200" indent="-224280">
               <a:lnSpc>
                 <a:spcPct val="100000"/>
               </a:lnSpc>
@@ -10478,7 +10242,7 @@
             </a:endParaRPr>
           </a:p>
           <a:p>
-            <a:pPr marL="457200" indent="-224640">
+            <a:pPr marL="457200" indent="-224280">
               <a:lnSpc>
                 <a:spcPct val="100000"/>
               </a:lnSpc>
@@ -10572,7 +10336,7 @@
         <p:spPr>
           <a:xfrm>
             <a:off x="338760" y="209520"/>
-            <a:ext cx="8516520" cy="568800"/>
+            <a:ext cx="8516160" cy="568440"/>
           </a:xfrm>
           <a:prstGeom prst="rect">
             <a:avLst/>
@@ -10625,7 +10389,7 @@
         <p:spPr>
           <a:xfrm>
             <a:off x="1752480" y="1047600"/>
-            <a:ext cx="5165280" cy="3561120"/>
+            <a:ext cx="5164920" cy="3560760"/>
           </a:xfrm>
           <a:prstGeom prst="rect">
             <a:avLst/>
@@ -10697,7 +10461,7 @@
         <p:spPr>
           <a:xfrm>
             <a:off x="5486400" y="895320"/>
-            <a:ext cx="2185560" cy="3012480"/>
+            <a:ext cx="2185200" cy="3012120"/>
           </a:xfrm>
           <a:prstGeom prst="rect">
             <a:avLst/>
@@ -10716,7 +10480,7 @@
         <p:spPr>
           <a:xfrm>
             <a:off x="338760" y="209520"/>
-            <a:ext cx="8516520" cy="568800"/>
+            <a:ext cx="8516160" cy="568440"/>
           </a:xfrm>
           <a:prstGeom prst="rect">
             <a:avLst/>
@@ -10785,7 +10549,7 @@
         <p:spPr>
           <a:xfrm>
             <a:off x="760320" y="3943440"/>
-            <a:ext cx="7123680" cy="784800"/>
+            <a:ext cx="7123320" cy="784440"/>
           </a:xfrm>
           <a:prstGeom prst="rect">
             <a:avLst/>
@@ -10838,7 +10602,7 @@
         <p:spPr>
           <a:xfrm>
             <a:off x="1676520" y="1327680"/>
-            <a:ext cx="3429360" cy="2313720"/>
+            <a:ext cx="3429000" cy="2313360"/>
           </a:xfrm>
           <a:prstGeom prst="rect">
             <a:avLst/>
@@ -10906,7 +10670,7 @@
         <p:spPr>
           <a:xfrm>
             <a:off x="311760" y="444960"/>
-            <a:ext cx="8516520" cy="568800"/>
+            <a:ext cx="8516160" cy="568440"/>
           </a:xfrm>
           <a:prstGeom prst="rect">
             <a:avLst/>
@@ -10975,7 +10739,7 @@
         <p:spPr>
           <a:xfrm>
             <a:off x="311760" y="1017720"/>
-            <a:ext cx="8516520" cy="4056120"/>
+            <a:ext cx="8516160" cy="4055760"/>
           </a:xfrm>
           <a:prstGeom prst="rect">
             <a:avLst/>
@@ -10994,7 +10758,7 @@
         <p:txBody>
           <a:bodyPr lIns="90000" rIns="90000" tIns="91440" bIns="91440"/>
           <a:p>
-            <a:pPr marL="457200" indent="-224640">
+            <a:pPr marL="457200" indent="-224280">
               <a:lnSpc>
                 <a:spcPct val="115000"/>
               </a:lnSpc>
@@ -11039,7 +10803,7 @@
         <p:spPr>
           <a:xfrm>
             <a:off x="394560" y="3385080"/>
-            <a:ext cx="1128960" cy="403920"/>
+            <a:ext cx="1128600" cy="403560"/>
           </a:xfrm>
           <a:prstGeom prst="rect">
             <a:avLst/>
@@ -11088,7 +10852,7 @@
         <p:spPr>
           <a:xfrm>
             <a:off x="7038360" y="2863440"/>
-            <a:ext cx="1685160" cy="479880"/>
+            <a:ext cx="1684800" cy="479520"/>
           </a:xfrm>
           <a:prstGeom prst="rect">
             <a:avLst/>
@@ -11137,7 +10901,7 @@
         <p:spPr>
           <a:xfrm>
             <a:off x="6324480" y="1741320"/>
-            <a:ext cx="1960920" cy="424080"/>
+            <a:ext cx="1960560" cy="423720"/>
           </a:xfrm>
           <a:prstGeom prst="rect">
             <a:avLst/>
@@ -11206,7 +10970,7 @@
         <p:spPr>
           <a:xfrm>
             <a:off x="2779200" y="1702080"/>
-            <a:ext cx="1756440" cy="250920"/>
+            <a:ext cx="1756080" cy="250560"/>
           </a:xfrm>
           <a:prstGeom prst="rect">
             <a:avLst/>
@@ -11255,7 +11019,7 @@
         <p:spPr>
           <a:xfrm>
             <a:off x="372960" y="3956760"/>
-            <a:ext cx="1166040" cy="533160"/>
+            <a:ext cx="1165680" cy="532800"/>
           </a:xfrm>
           <a:prstGeom prst="rect">
             <a:avLst/>
@@ -11334,7 +11098,7 @@
         <p:spPr>
           <a:xfrm>
             <a:off x="152280" y="2647080"/>
-            <a:ext cx="1904760" cy="659160"/>
+            <a:ext cx="1904400" cy="658800"/>
           </a:xfrm>
           <a:prstGeom prst="rect">
             <a:avLst/>
@@ -11423,7 +11187,7 @@
         <p:spPr>
           <a:xfrm>
             <a:off x="7140240" y="2302920"/>
-            <a:ext cx="1348920" cy="369360"/>
+            <a:ext cx="1348560" cy="369000"/>
           </a:xfrm>
           <a:prstGeom prst="rect">
             <a:avLst/>
@@ -11472,7 +11236,7 @@
         <p:spPr>
           <a:xfrm>
             <a:off x="2132640" y="4535280"/>
-            <a:ext cx="1675440" cy="403920"/>
+            <a:ext cx="1675080" cy="403560"/>
           </a:xfrm>
           <a:prstGeom prst="rect">
             <a:avLst/>
@@ -11521,7 +11285,7 @@
         <p:spPr>
           <a:xfrm>
             <a:off x="3796200" y="4444200"/>
-            <a:ext cx="1675440" cy="403920"/>
+            <a:ext cx="1675080" cy="403560"/>
           </a:xfrm>
           <a:prstGeom prst="rect">
             <a:avLst/>
@@ -11574,7 +11338,7 @@
         <p:spPr>
           <a:xfrm>
             <a:off x="2658240" y="2013480"/>
-            <a:ext cx="3473640" cy="2394720"/>
+            <a:ext cx="3473280" cy="2394360"/>
           </a:xfrm>
           <a:prstGeom prst="rect">
             <a:avLst/>
@@ -11592,8 +11356,8 @@
         </p:nvSpPr>
         <p:spPr>
           <a:xfrm flipH="1" flipV="1">
-            <a:off x="1438200" y="3517200"/>
-            <a:ext cx="2432880" cy="76680"/>
+            <a:off x="1437480" y="3517200"/>
+            <a:ext cx="2432520" cy="76320"/>
           </a:xfrm>
           <a:custGeom>
             <a:avLst/>
@@ -11636,7 +11400,7 @@
         <p:spPr>
           <a:xfrm>
             <a:off x="5755320" y="2647080"/>
-            <a:ext cx="1281960" cy="398160"/>
+            <a:ext cx="1281600" cy="397800"/>
           </a:xfrm>
           <a:custGeom>
             <a:avLst/>
@@ -11679,7 +11443,7 @@
         <p:spPr>
           <a:xfrm>
             <a:off x="6972120" y="3317040"/>
-            <a:ext cx="1685160" cy="479880"/>
+            <a:ext cx="1684800" cy="479520"/>
           </a:xfrm>
           <a:prstGeom prst="rect">
             <a:avLst/>
@@ -11727,8 +11491,8 @@
         </p:nvSpPr>
         <p:spPr>
           <a:xfrm flipV="1">
-            <a:off x="5867280" y="3319560"/>
-            <a:ext cx="1170000" cy="44640"/>
+            <a:off x="5867280" y="3274560"/>
+            <a:ext cx="1169640" cy="44280"/>
           </a:xfrm>
           <a:custGeom>
             <a:avLst/>
@@ -11771,7 +11535,7 @@
         <p:spPr>
           <a:xfrm>
             <a:off x="3872880" y="2446560"/>
-            <a:ext cx="3266640" cy="44640"/>
+            <a:ext cx="3266280" cy="44280"/>
           </a:xfrm>
           <a:custGeom>
             <a:avLst/>
@@ -11813,8 +11577,8 @@
         </p:nvSpPr>
         <p:spPr>
           <a:xfrm flipH="1" flipV="1">
-            <a:off x="3808440" y="1953360"/>
-            <a:ext cx="228240" cy="347760"/>
+            <a:off x="3807720" y="1952640"/>
+            <a:ext cx="227880" cy="347400"/>
           </a:xfrm>
           <a:custGeom>
             <a:avLst/>
@@ -11857,7 +11621,7 @@
         <p:spPr>
           <a:xfrm flipH="1" flipV="1">
             <a:off x="1523160" y="2976120"/>
-            <a:ext cx="1369800" cy="204120"/>
+            <a:ext cx="1369440" cy="203760"/>
           </a:xfrm>
           <a:custGeom>
             <a:avLst/>
@@ -11900,7 +11664,7 @@
         <p:spPr>
           <a:xfrm flipH="1">
             <a:off x="1294560" y="3894480"/>
-            <a:ext cx="1544760" cy="357840"/>
+            <a:ext cx="1544400" cy="357480"/>
           </a:xfrm>
           <a:custGeom>
             <a:avLst/>
@@ -11942,8 +11706,8 @@
         </p:nvSpPr>
         <p:spPr>
           <a:xfrm flipH="1" flipV="1">
-            <a:off x="1711080" y="2256480"/>
-            <a:ext cx="1362960" cy="44640"/>
+            <a:off x="1710360" y="2255760"/>
+            <a:ext cx="1362600" cy="44280"/>
           </a:xfrm>
           <a:custGeom>
             <a:avLst/>
@@ -11986,7 +11750,7 @@
         <p:spPr>
           <a:xfrm>
             <a:off x="267480" y="1878840"/>
-            <a:ext cx="1443240" cy="566640"/>
+            <a:ext cx="1442880" cy="566280"/>
           </a:xfrm>
           <a:prstGeom prst="rect">
             <a:avLst/>
@@ -12034,8 +11798,8 @@
         </p:nvSpPr>
         <p:spPr>
           <a:xfrm flipH="1">
-            <a:off x="3154680" y="4252680"/>
-            <a:ext cx="45360" cy="389160"/>
+            <a:off x="3153960" y="4252680"/>
+            <a:ext cx="45000" cy="388800"/>
           </a:xfrm>
           <a:custGeom>
             <a:avLst/>
@@ -12077,8 +11841,8 @@
         </p:nvSpPr>
         <p:spPr>
           <a:xfrm flipH="1">
-            <a:off x="4267080" y="4249440"/>
-            <a:ext cx="45360" cy="389160"/>
+            <a:off x="4266360" y="4249440"/>
+            <a:ext cx="45000" cy="388800"/>
           </a:xfrm>
           <a:custGeom>
             <a:avLst/>
@@ -12120,8 +11884,8 @@
         </p:nvSpPr>
         <p:spPr>
           <a:xfrm flipV="1">
-            <a:off x="5608440" y="1656000"/>
-            <a:ext cx="787680" cy="297360"/>
+            <a:off x="5608440" y="1358280"/>
+            <a:ext cx="787320" cy="297000"/>
           </a:xfrm>
           <a:custGeom>
             <a:avLst/>
@@ -12163,8 +11927,8 @@
         </p:nvSpPr>
         <p:spPr>
           <a:xfrm flipV="1">
-            <a:off x="5755320" y="3830040"/>
-            <a:ext cx="1281960" cy="155520"/>
+            <a:off x="5755320" y="3674160"/>
+            <a:ext cx="1281600" cy="155160"/>
           </a:xfrm>
           <a:custGeom>
             <a:avLst/>
@@ -12207,7 +11971,7 @@
         <p:spPr>
           <a:xfrm>
             <a:off x="7027560" y="3823560"/>
-            <a:ext cx="786960" cy="348120"/>
+            <a:ext cx="786600" cy="347760"/>
           </a:xfrm>
           <a:prstGeom prst="rect">
             <a:avLst/>
@@ -12256,7 +12020,7 @@
         <p:spPr>
           <a:xfrm>
             <a:off x="6858000" y="4453560"/>
-            <a:ext cx="1631160" cy="348120"/>
+            <a:ext cx="1630800" cy="347760"/>
           </a:xfrm>
           <a:prstGeom prst="rect">
             <a:avLst/>
@@ -12305,7 +12069,7 @@
         <p:spPr>
           <a:xfrm>
             <a:off x="5029200" y="4063680"/>
-            <a:ext cx="1828440" cy="582480"/>
+            <a:ext cx="1828080" cy="582120"/>
           </a:xfrm>
           <a:custGeom>
             <a:avLst/>
@@ -12397,7 +12161,7 @@
         <p:spPr>
           <a:xfrm>
             <a:off x="228600" y="285840"/>
-            <a:ext cx="8516520" cy="568800"/>
+            <a:ext cx="8516160" cy="568440"/>
           </a:xfrm>
           <a:prstGeom prst="rect">
             <a:avLst/>
@@ -12476,7 +12240,7 @@
         <p:spPr>
           <a:xfrm>
             <a:off x="311760" y="1017720"/>
-            <a:ext cx="8516520" cy="4056120"/>
+            <a:ext cx="8516160" cy="4055760"/>
           </a:xfrm>
           <a:prstGeom prst="rect">
             <a:avLst/>
@@ -12502,7 +12266,7 @@
         <p:spPr>
           <a:xfrm>
             <a:off x="7625880" y="4425480"/>
-            <a:ext cx="1473120" cy="568800"/>
+            <a:ext cx="1472760" cy="568440"/>
           </a:xfrm>
           <a:prstGeom prst="rect">
             <a:avLst/>
@@ -12528,7 +12292,7 @@
         <p:spPr>
           <a:xfrm>
             <a:off x="938520" y="1014480"/>
-            <a:ext cx="7263000" cy="3630600"/>
+            <a:ext cx="7262640" cy="3630240"/>
           </a:xfrm>
           <a:prstGeom prst="rect">
             <a:avLst/>
@@ -12611,7 +12375,7 @@
         <p:spPr>
           <a:xfrm>
             <a:off x="4389120" y="2193840"/>
-            <a:ext cx="3932640" cy="2880000"/>
+            <a:ext cx="3932280" cy="2879640"/>
           </a:xfrm>
           <a:prstGeom prst="rect">
             <a:avLst/>
@@ -12679,7 +12443,7 @@
         <p:spPr>
           <a:xfrm>
             <a:off x="228600" y="285840"/>
-            <a:ext cx="8516520" cy="568800"/>
+            <a:ext cx="8516160" cy="568440"/>
           </a:xfrm>
           <a:prstGeom prst="rect">
             <a:avLst/>
@@ -12758,7 +12522,7 @@
         <p:spPr>
           <a:xfrm>
             <a:off x="311760" y="1017720"/>
-            <a:ext cx="8516520" cy="4056120"/>
+            <a:ext cx="8516160" cy="4055760"/>
           </a:xfrm>
           <a:prstGeom prst="rect">
             <a:avLst/>
@@ -12784,7 +12548,7 @@
         <p:spPr>
           <a:xfrm>
             <a:off x="7625880" y="4425480"/>
-            <a:ext cx="1473120" cy="568800"/>
+            <a:ext cx="1472760" cy="568440"/>
           </a:xfrm>
           <a:prstGeom prst="rect">
             <a:avLst/>
@@ -12810,7 +12574,7 @@
         <p:spPr>
           <a:xfrm>
             <a:off x="938520" y="1014480"/>
-            <a:ext cx="7263000" cy="3630600"/>
+            <a:ext cx="7262640" cy="3630240"/>
           </a:xfrm>
           <a:prstGeom prst="rect">
             <a:avLst/>
@@ -12893,7 +12657,7 @@
         <p:spPr>
           <a:xfrm>
             <a:off x="317160" y="2187000"/>
-            <a:ext cx="3066120" cy="2842200"/>
+            <a:ext cx="3065760" cy="2841840"/>
           </a:xfrm>
           <a:prstGeom prst="rect">
             <a:avLst/>
@@ -12916,7 +12680,7 @@
         <p:spPr>
           <a:xfrm>
             <a:off x="3931920" y="2181240"/>
-            <a:ext cx="4132800" cy="2756520"/>
+            <a:ext cx="4132440" cy="2756160"/>
           </a:xfrm>
           <a:prstGeom prst="rect">
             <a:avLst/>
@@ -12935,7 +12699,7 @@
         <p:spPr>
           <a:xfrm>
             <a:off x="348120" y="1512000"/>
-            <a:ext cx="8457120" cy="249480"/>
+            <a:ext cx="8456760" cy="249120"/>
           </a:xfrm>
           <a:prstGeom prst="rect">
             <a:avLst/>
@@ -13033,7 +12797,7 @@
         <p:spPr>
           <a:xfrm>
             <a:off x="228600" y="285840"/>
-            <a:ext cx="8516520" cy="568800"/>
+            <a:ext cx="8516160" cy="568440"/>
           </a:xfrm>
           <a:prstGeom prst="rect">
             <a:avLst/>
@@ -13112,7 +12876,7 @@
         <p:spPr>
           <a:xfrm>
             <a:off x="311760" y="1017720"/>
-            <a:ext cx="8516520" cy="4056120"/>
+            <a:ext cx="8516160" cy="4055760"/>
           </a:xfrm>
           <a:prstGeom prst="rect">
             <a:avLst/>
@@ -13138,7 +12902,7 @@
         <p:spPr>
           <a:xfrm>
             <a:off x="7625880" y="4425480"/>
-            <a:ext cx="1473120" cy="568800"/>
+            <a:ext cx="1472760" cy="568440"/>
           </a:xfrm>
           <a:prstGeom prst="rect">
             <a:avLst/>
@@ -13164,7 +12928,7 @@
         <p:spPr>
           <a:xfrm>
             <a:off x="938520" y="1014480"/>
-            <a:ext cx="7263000" cy="3630600"/>
+            <a:ext cx="7262640" cy="3630240"/>
           </a:xfrm>
           <a:prstGeom prst="rect">
             <a:avLst/>
@@ -13243,7 +13007,7 @@
         <p:spPr>
           <a:xfrm>
             <a:off x="365760" y="2194560"/>
-            <a:ext cx="3749040" cy="2560320"/>
+            <a:ext cx="3748680" cy="2559960"/>
           </a:xfrm>
           <a:prstGeom prst="rect">
             <a:avLst/>
@@ -13277,7 +13041,7 @@
               </a:rPr>
               <a:t>For example AT+CWLAP command will scan all WiFi Network,</a:t>
             </a:r>
-            <a:endParaRPr b="1" lang="en-US" sz="1400" spc="-1" strike="noStrike">
+            <a:endParaRPr b="0" lang="en-US" sz="1400" spc="-1" strike="noStrike">
               <a:latin typeface="Arial"/>
             </a:endParaRPr>
           </a:p>
@@ -13287,7 +13051,7 @@
                 <a:spcPct val="100000"/>
               </a:lnSpc>
             </a:pPr>
-            <a:endParaRPr b="1" lang="en-US" sz="1400" spc="-1" strike="noStrike">
+            <a:endParaRPr b="0" lang="en-US" sz="1400" spc="-1" strike="noStrike">
               <a:latin typeface="Arial"/>
             </a:endParaRPr>
           </a:p>
@@ -13317,7 +13081,7 @@
               </a:rPr>
               <a:t>AT+CWJAP,”Asea”,”lammu” to join a network </a:t>
             </a:r>
-            <a:endParaRPr b="1" lang="en-US" sz="1400" spc="-1" strike="noStrike">
+            <a:endParaRPr b="0" lang="en-US" sz="1400" spc="-1" strike="noStrike">
               <a:latin typeface="Arial"/>
             </a:endParaRPr>
           </a:p>
@@ -13357,7 +13121,7 @@
               </a:rPr>
               <a:t> or communication setting  which is 115200 bps)</a:t>
             </a:r>
-            <a:endParaRPr b="1" lang="en-US" sz="1400" spc="-1" strike="noStrike">
+            <a:endParaRPr b="0" lang="en-US" sz="1400" spc="-1" strike="noStrike">
               <a:latin typeface="Arial"/>
             </a:endParaRPr>
           </a:p>
@@ -13376,7 +13140,7 @@
         <p:spPr>
           <a:xfrm>
             <a:off x="4645440" y="2038320"/>
-            <a:ext cx="4132800" cy="2756520"/>
+            <a:ext cx="4132440" cy="2756160"/>
           </a:xfrm>
           <a:prstGeom prst="rect">
             <a:avLst/>
@@ -13444,7 +13208,7 @@
         <p:spPr>
           <a:xfrm>
             <a:off x="228600" y="285840"/>
-            <a:ext cx="8516520" cy="568800"/>
+            <a:ext cx="8516160" cy="568440"/>
           </a:xfrm>
           <a:prstGeom prst="rect">
             <a:avLst/>
@@ -13523,7 +13287,7 @@
         <p:spPr>
           <a:xfrm>
             <a:off x="311760" y="1017720"/>
-            <a:ext cx="8516520" cy="4056120"/>
+            <a:ext cx="8516160" cy="4055760"/>
           </a:xfrm>
           <a:prstGeom prst="rect">
             <a:avLst/>
@@ -13549,7 +13313,7 @@
         <p:spPr>
           <a:xfrm>
             <a:off x="7625880" y="4425480"/>
-            <a:ext cx="1473120" cy="568800"/>
+            <a:ext cx="1472760" cy="568440"/>
           </a:xfrm>
           <a:prstGeom prst="rect">
             <a:avLst/>
@@ -13575,7 +13339,7 @@
         <p:spPr>
           <a:xfrm>
             <a:off x="938520" y="1014480"/>
-            <a:ext cx="7263000" cy="3630600"/>
+            <a:ext cx="7262640" cy="3630240"/>
           </a:xfrm>
           <a:prstGeom prst="rect">
             <a:avLst/>
@@ -13658,7 +13422,7 @@
         <p:spPr>
           <a:xfrm>
             <a:off x="4739760" y="2046960"/>
-            <a:ext cx="4266720" cy="2598120"/>
+            <a:ext cx="4266360" cy="2597760"/>
           </a:xfrm>
           <a:prstGeom prst="rect">
             <a:avLst/>
@@ -13681,7 +13445,7 @@
         <p:spPr>
           <a:xfrm>
             <a:off x="308880" y="1881000"/>
-            <a:ext cx="4346280" cy="2930040"/>
+            <a:ext cx="4345920" cy="2929680"/>
           </a:xfrm>
           <a:prstGeom prst="rect">
             <a:avLst/>

</xml_diff>